<commit_message>
Updating w/ ratings distribution
Adding slides to cover ratings frequency distributions
</commit_message>
<xml_diff>
--- a/DATS6101_Midterm_Presentation.pptx
+++ b/DATS6101_Midterm_Presentation.pptx
@@ -16,16 +16,18 @@
     <p:sldId id="263" r:id="rId10"/>
     <p:sldId id="265" r:id="rId11"/>
     <p:sldId id="266" r:id="rId12"/>
-    <p:sldId id="267" r:id="rId13"/>
-    <p:sldId id="268" r:id="rId14"/>
-    <p:sldId id="269" r:id="rId15"/>
-    <p:sldId id="270" r:id="rId16"/>
-    <p:sldId id="271" r:id="rId17"/>
-    <p:sldId id="272" r:id="rId18"/>
-    <p:sldId id="273" r:id="rId19"/>
-    <p:sldId id="274" r:id="rId20"/>
-    <p:sldId id="275" r:id="rId21"/>
-    <p:sldId id="276" r:id="rId22"/>
+    <p:sldId id="277" r:id="rId13"/>
+    <p:sldId id="278" r:id="rId14"/>
+    <p:sldId id="267" r:id="rId15"/>
+    <p:sldId id="268" r:id="rId16"/>
+    <p:sldId id="269" r:id="rId17"/>
+    <p:sldId id="270" r:id="rId18"/>
+    <p:sldId id="271" r:id="rId19"/>
+    <p:sldId id="272" r:id="rId20"/>
+    <p:sldId id="273" r:id="rId21"/>
+    <p:sldId id="274" r:id="rId22"/>
+    <p:sldId id="275" r:id="rId23"/>
+    <p:sldId id="276" r:id="rId24"/>
   </p:sldIdLst>
   <p:sldSz cx="12192000" cy="6858000"/>
   <p:notesSz cx="6858000" cy="9144000"/>
@@ -4188,6 +4190,602 @@
           <p:cNvPr id="2" name="Title 1">
             <a:extLst>
               <a:ext uri="{FF2B5EF4-FFF2-40B4-BE49-F238E27FC236}">
+                <a16:creationId xmlns:a16="http://schemas.microsoft.com/office/drawing/2014/main" id="{17C0BA54-4ED8-B0C3-AF1B-83C8A0E446B1}"/>
+              </a:ext>
+            </a:extLst>
+          </p:cNvPr>
+          <p:cNvSpPr>
+            <a:spLocks noGrp="1"/>
+          </p:cNvSpPr>
+          <p:nvPr>
+            <p:ph type="title"/>
+          </p:nvPr>
+        </p:nvSpPr>
+        <p:spPr>
+          <a:xfrm>
+            <a:off x="838200" y="365125"/>
+            <a:ext cx="3807691" cy="1325563"/>
+          </a:xfrm>
+        </p:spPr>
+        <p:txBody>
+          <a:bodyPr/>
+          <a:lstStyle/>
+          <a:p>
+            <a:r>
+              <a:rPr lang="en-US" dirty="0"/>
+              <a:t>Variable Distributions</a:t>
+            </a:r>
+          </a:p>
+        </p:txBody>
+      </p:sp>
+      <p:sp>
+        <p:nvSpPr>
+          <p:cNvPr id="3" name="TextBox 2">
+            <a:extLst>
+              <a:ext uri="{FF2B5EF4-FFF2-40B4-BE49-F238E27FC236}">
+                <a16:creationId xmlns:a16="http://schemas.microsoft.com/office/drawing/2014/main" id="{85673DAE-BE0E-D7B6-042F-3D751C34E89B}"/>
+              </a:ext>
+            </a:extLst>
+          </p:cNvPr>
+          <p:cNvSpPr txBox="1"/>
+          <p:nvPr/>
+        </p:nvSpPr>
+        <p:spPr>
+          <a:xfrm>
+            <a:off x="881063" y="1757878"/>
+            <a:ext cx="3583709" cy="369332"/>
+          </a:xfrm>
+          <a:prstGeom prst="rect">
+            <a:avLst/>
+          </a:prstGeom>
+          <a:noFill/>
+        </p:spPr>
+        <p:txBody>
+          <a:bodyPr wrap="square" rtlCol="0">
+            <a:spAutoFit/>
+          </a:bodyPr>
+          <a:lstStyle/>
+          <a:p>
+            <a:r>
+              <a:rPr lang="en-US" b="1" dirty="0">
+                <a:solidFill>
+                  <a:schemeClr val="bg1">
+                    <a:lumMod val="50000"/>
+                  </a:schemeClr>
+                </a:solidFill>
+              </a:rPr>
+              <a:t>Part 3: Ordinal Variables (1/2)</a:t>
+            </a:r>
+          </a:p>
+        </p:txBody>
+      </p:sp>
+      <p:sp>
+        <p:nvSpPr>
+          <p:cNvPr id="4" name="TextBox 3">
+            <a:extLst>
+              <a:ext uri="{FF2B5EF4-FFF2-40B4-BE49-F238E27FC236}">
+                <a16:creationId xmlns:a16="http://schemas.microsoft.com/office/drawing/2014/main" id="{3D8CEEDB-BA7C-AA9E-BD52-2E6B97C953D9}"/>
+              </a:ext>
+            </a:extLst>
+          </p:cNvPr>
+          <p:cNvSpPr txBox="1"/>
+          <p:nvPr/>
+        </p:nvSpPr>
+        <p:spPr>
+          <a:xfrm>
+            <a:off x="838200" y="2324100"/>
+            <a:ext cx="3484418" cy="1754326"/>
+          </a:xfrm>
+          <a:prstGeom prst="rect">
+            <a:avLst/>
+          </a:prstGeom>
+          <a:noFill/>
+        </p:spPr>
+        <p:txBody>
+          <a:bodyPr wrap="square" rtlCol="0">
+            <a:spAutoFit/>
+          </a:bodyPr>
+          <a:lstStyle/>
+          <a:p>
+            <a:pPr marL="285750" indent="-285750" algn="l">
+              <a:spcAft>
+                <a:spcPts val="600"/>
+              </a:spcAft>
+              <a:buFont typeface="Arial" panose="020B0604020202020204" pitchFamily="34" charset="0"/>
+              <a:buChar char="•"/>
+            </a:pPr>
+            <a:r>
+              <a:rPr lang="en-US" b="0" dirty="0">
+                <a:solidFill>
+                  <a:srgbClr val="333333"/>
+                </a:solidFill>
+                <a:effectLst/>
+              </a:rPr>
+              <a:t>Many of the individual ratings variables display similar distributions; we noted at this stage that transformations may be required to avoid multicollinearity concerns.</a:t>
+            </a:r>
+            <a:endParaRPr lang="en-US" dirty="0"/>
+          </a:p>
+        </p:txBody>
+      </p:sp>
+      <p:sp>
+        <p:nvSpPr>
+          <p:cNvPr id="5" name="Isosceles Triangle 4">
+            <a:extLst>
+              <a:ext uri="{FF2B5EF4-FFF2-40B4-BE49-F238E27FC236}">
+                <a16:creationId xmlns:a16="http://schemas.microsoft.com/office/drawing/2014/main" id="{BDA734F0-DFF6-D492-D43D-43450C1E88E1}"/>
+              </a:ext>
+            </a:extLst>
+          </p:cNvPr>
+          <p:cNvSpPr/>
+          <p:nvPr/>
+        </p:nvSpPr>
+        <p:spPr>
+          <a:xfrm rot="10800000" flipH="1" flipV="1">
+            <a:off x="0" y="5724525"/>
+            <a:ext cx="4429125" cy="1133475"/>
+          </a:xfrm>
+          <a:prstGeom prst="triangle">
+            <a:avLst>
+              <a:gd name="adj" fmla="val 0"/>
+            </a:avLst>
+          </a:prstGeom>
+          <a:solidFill>
+            <a:schemeClr val="accent1">
+              <a:lumMod val="40000"/>
+              <a:lumOff val="60000"/>
+            </a:schemeClr>
+          </a:solidFill>
+          <a:ln>
+            <a:solidFill>
+              <a:schemeClr val="tx2">
+                <a:lumMod val="40000"/>
+                <a:lumOff val="60000"/>
+              </a:schemeClr>
+            </a:solidFill>
+          </a:ln>
+        </p:spPr>
+        <p:style>
+          <a:lnRef idx="2">
+            <a:schemeClr val="accent1">
+              <a:shade val="15000"/>
+            </a:schemeClr>
+          </a:lnRef>
+          <a:fillRef idx="1">
+            <a:schemeClr val="accent1"/>
+          </a:fillRef>
+          <a:effectRef idx="0">
+            <a:schemeClr val="accent1"/>
+          </a:effectRef>
+          <a:fontRef idx="minor">
+            <a:schemeClr val="lt1"/>
+          </a:fontRef>
+        </p:style>
+        <p:txBody>
+          <a:bodyPr rtlCol="0" anchor="ctr"/>
+          <a:lstStyle/>
+          <a:p>
+            <a:pPr algn="ctr"/>
+            <a:endParaRPr lang="en-US"/>
+          </a:p>
+        </p:txBody>
+      </p:sp>
+      <p:pic>
+        <p:nvPicPr>
+          <p:cNvPr id="6" name="Graphic 5" descr="Cloud">
+            <a:extLst>
+              <a:ext uri="{FF2B5EF4-FFF2-40B4-BE49-F238E27FC236}">
+                <a16:creationId xmlns:a16="http://schemas.microsoft.com/office/drawing/2014/main" id="{79BF84CE-F9AB-F8E2-1720-1234B40DDD6B}"/>
+              </a:ext>
+            </a:extLst>
+          </p:cNvPr>
+          <p:cNvPicPr>
+            <a:picLocks noChangeAspect="1"/>
+          </p:cNvPicPr>
+          <p:nvPr/>
+        </p:nvPicPr>
+        <p:blipFill>
+          <a:blip r:embed="rId2">
+            <a:extLst>
+              <a:ext uri="{28A0092B-C50C-407E-A947-70E740481C1C}">
+                <a14:useLocalDpi xmlns:a14="http://schemas.microsoft.com/office/drawing/2010/main" val="0"/>
+              </a:ext>
+              <a:ext uri="{96DAC541-7B7A-43D3-8B79-37D633B846F1}">
+                <asvg:svgBlip xmlns:asvg="http://schemas.microsoft.com/office/drawing/2016/SVG/main" r:embed="rId3"/>
+              </a:ext>
+            </a:extLst>
+          </a:blip>
+          <a:stretch>
+            <a:fillRect/>
+          </a:stretch>
+        </p:blipFill>
+        <p:spPr>
+          <a:xfrm>
+            <a:off x="76200" y="5724525"/>
+            <a:ext cx="1333500" cy="1333500"/>
+          </a:xfrm>
+          <a:prstGeom prst="rect">
+            <a:avLst/>
+          </a:prstGeom>
+        </p:spPr>
+      </p:pic>
+      <p:pic>
+        <p:nvPicPr>
+          <p:cNvPr id="21506" name="Picture 2">
+            <a:extLst>
+              <a:ext uri="{FF2B5EF4-FFF2-40B4-BE49-F238E27FC236}">
+                <a16:creationId xmlns:a16="http://schemas.microsoft.com/office/drawing/2014/main" id="{239F74B1-4306-F5C9-F74A-03F43EA74287}"/>
+              </a:ext>
+            </a:extLst>
+          </p:cNvPr>
+          <p:cNvPicPr>
+            <a:picLocks noChangeAspect="1" noChangeArrowheads="1"/>
+          </p:cNvPicPr>
+          <p:nvPr/>
+        </p:nvPicPr>
+        <p:blipFill rotWithShape="1">
+          <a:blip r:embed="rId4">
+            <a:extLst>
+              <a:ext uri="{28A0092B-C50C-407E-A947-70E740481C1C}">
+                <a14:useLocalDpi xmlns:a14="http://schemas.microsoft.com/office/drawing/2010/main" val="0"/>
+              </a:ext>
+            </a:extLst>
+          </a:blip>
+          <a:srcRect b="56834"/>
+          <a:stretch/>
+        </p:blipFill>
+        <p:spPr bwMode="auto">
+          <a:xfrm>
+            <a:off x="5560446" y="928212"/>
+            <a:ext cx="5793354" cy="5001576"/>
+          </a:xfrm>
+          <a:prstGeom prst="rect">
+            <a:avLst/>
+          </a:prstGeom>
+          <a:noFill/>
+          <a:extLst>
+            <a:ext uri="{909E8E84-426E-40DD-AFC4-6F175D3DCCD1}">
+              <a14:hiddenFill xmlns:a14="http://schemas.microsoft.com/office/drawing/2010/main">
+                <a:solidFill>
+                  <a:srgbClr val="FFFFFF"/>
+                </a:solidFill>
+              </a14:hiddenFill>
+            </a:ext>
+          </a:extLst>
+        </p:spPr>
+      </p:pic>
+    </p:spTree>
+    <p:extLst>
+      <p:ext uri="{BB962C8B-B14F-4D97-AF65-F5344CB8AC3E}">
+        <p14:creationId xmlns:p14="http://schemas.microsoft.com/office/powerpoint/2010/main" val="1949322486"/>
+      </p:ext>
+    </p:extLst>
+  </p:cSld>
+  <p:clrMapOvr>
+    <a:masterClrMapping/>
+  </p:clrMapOvr>
+</p:sld>
+</file>
+
+<file path=ppt/slides/slide13.xml><?xml version="1.0" encoding="utf-8"?>
+<p:sld xmlns:a="http://schemas.openxmlformats.org/drawingml/2006/main" xmlns:r="http://schemas.openxmlformats.org/officeDocument/2006/relationships" xmlns:p="http://schemas.openxmlformats.org/presentationml/2006/main">
+  <p:cSld>
+    <p:spTree>
+      <p:nvGrpSpPr>
+        <p:cNvPr id="1" name=""/>
+        <p:cNvGrpSpPr/>
+        <p:nvPr/>
+      </p:nvGrpSpPr>
+      <p:grpSpPr>
+        <a:xfrm>
+          <a:off x="0" y="0"/>
+          <a:ext cx="0" cy="0"/>
+          <a:chOff x="0" y="0"/>
+          <a:chExt cx="0" cy="0"/>
+        </a:xfrm>
+      </p:grpSpPr>
+      <p:sp>
+        <p:nvSpPr>
+          <p:cNvPr id="2" name="Title 1">
+            <a:extLst>
+              <a:ext uri="{FF2B5EF4-FFF2-40B4-BE49-F238E27FC236}">
+                <a16:creationId xmlns:a16="http://schemas.microsoft.com/office/drawing/2014/main" id="{17C0BA54-4ED8-B0C3-AF1B-83C8A0E446B1}"/>
+              </a:ext>
+            </a:extLst>
+          </p:cNvPr>
+          <p:cNvSpPr>
+            <a:spLocks noGrp="1"/>
+          </p:cNvSpPr>
+          <p:nvPr>
+            <p:ph type="title"/>
+          </p:nvPr>
+        </p:nvSpPr>
+        <p:spPr>
+          <a:xfrm>
+            <a:off x="838200" y="365125"/>
+            <a:ext cx="3807691" cy="1325563"/>
+          </a:xfrm>
+        </p:spPr>
+        <p:txBody>
+          <a:bodyPr/>
+          <a:lstStyle/>
+          <a:p>
+            <a:r>
+              <a:rPr lang="en-US" dirty="0"/>
+              <a:t>Variable Distributions</a:t>
+            </a:r>
+          </a:p>
+        </p:txBody>
+      </p:sp>
+      <p:sp>
+        <p:nvSpPr>
+          <p:cNvPr id="3" name="TextBox 2">
+            <a:extLst>
+              <a:ext uri="{FF2B5EF4-FFF2-40B4-BE49-F238E27FC236}">
+                <a16:creationId xmlns:a16="http://schemas.microsoft.com/office/drawing/2014/main" id="{85673DAE-BE0E-D7B6-042F-3D751C34E89B}"/>
+              </a:ext>
+            </a:extLst>
+          </p:cNvPr>
+          <p:cNvSpPr txBox="1"/>
+          <p:nvPr/>
+        </p:nvSpPr>
+        <p:spPr>
+          <a:xfrm>
+            <a:off x="881063" y="1757878"/>
+            <a:ext cx="3583709" cy="369332"/>
+          </a:xfrm>
+          <a:prstGeom prst="rect">
+            <a:avLst/>
+          </a:prstGeom>
+          <a:noFill/>
+        </p:spPr>
+        <p:txBody>
+          <a:bodyPr wrap="square" rtlCol="0">
+            <a:spAutoFit/>
+          </a:bodyPr>
+          <a:lstStyle/>
+          <a:p>
+            <a:r>
+              <a:rPr lang="en-US" b="1" dirty="0">
+                <a:solidFill>
+                  <a:schemeClr val="bg1">
+                    <a:lumMod val="50000"/>
+                  </a:schemeClr>
+                </a:solidFill>
+              </a:rPr>
+              <a:t>Part 3: Ordinal Variables (2/2)</a:t>
+            </a:r>
+          </a:p>
+        </p:txBody>
+      </p:sp>
+      <p:sp>
+        <p:nvSpPr>
+          <p:cNvPr id="5" name="Isosceles Triangle 4">
+            <a:extLst>
+              <a:ext uri="{FF2B5EF4-FFF2-40B4-BE49-F238E27FC236}">
+                <a16:creationId xmlns:a16="http://schemas.microsoft.com/office/drawing/2014/main" id="{BDA734F0-DFF6-D492-D43D-43450C1E88E1}"/>
+              </a:ext>
+            </a:extLst>
+          </p:cNvPr>
+          <p:cNvSpPr/>
+          <p:nvPr/>
+        </p:nvSpPr>
+        <p:spPr>
+          <a:xfrm rot="10800000" flipH="1" flipV="1">
+            <a:off x="0" y="5724525"/>
+            <a:ext cx="4429125" cy="1133475"/>
+          </a:xfrm>
+          <a:prstGeom prst="triangle">
+            <a:avLst>
+              <a:gd name="adj" fmla="val 0"/>
+            </a:avLst>
+          </a:prstGeom>
+          <a:solidFill>
+            <a:schemeClr val="accent1">
+              <a:lumMod val="40000"/>
+              <a:lumOff val="60000"/>
+            </a:schemeClr>
+          </a:solidFill>
+          <a:ln>
+            <a:solidFill>
+              <a:schemeClr val="tx2">
+                <a:lumMod val="40000"/>
+                <a:lumOff val="60000"/>
+              </a:schemeClr>
+            </a:solidFill>
+          </a:ln>
+        </p:spPr>
+        <p:style>
+          <a:lnRef idx="2">
+            <a:schemeClr val="accent1">
+              <a:shade val="15000"/>
+            </a:schemeClr>
+          </a:lnRef>
+          <a:fillRef idx="1">
+            <a:schemeClr val="accent1"/>
+          </a:fillRef>
+          <a:effectRef idx="0">
+            <a:schemeClr val="accent1"/>
+          </a:effectRef>
+          <a:fontRef idx="minor">
+            <a:schemeClr val="lt1"/>
+          </a:fontRef>
+        </p:style>
+        <p:txBody>
+          <a:bodyPr rtlCol="0" anchor="ctr"/>
+          <a:lstStyle/>
+          <a:p>
+            <a:pPr algn="ctr"/>
+            <a:endParaRPr lang="en-US"/>
+          </a:p>
+        </p:txBody>
+      </p:sp>
+      <p:pic>
+        <p:nvPicPr>
+          <p:cNvPr id="6" name="Graphic 5" descr="Cloud">
+            <a:extLst>
+              <a:ext uri="{FF2B5EF4-FFF2-40B4-BE49-F238E27FC236}">
+                <a16:creationId xmlns:a16="http://schemas.microsoft.com/office/drawing/2014/main" id="{79BF84CE-F9AB-F8E2-1720-1234B40DDD6B}"/>
+              </a:ext>
+            </a:extLst>
+          </p:cNvPr>
+          <p:cNvPicPr>
+            <a:picLocks noChangeAspect="1"/>
+          </p:cNvPicPr>
+          <p:nvPr/>
+        </p:nvPicPr>
+        <p:blipFill>
+          <a:blip r:embed="rId2">
+            <a:extLst>
+              <a:ext uri="{28A0092B-C50C-407E-A947-70E740481C1C}">
+                <a14:useLocalDpi xmlns:a14="http://schemas.microsoft.com/office/drawing/2010/main" val="0"/>
+              </a:ext>
+              <a:ext uri="{96DAC541-7B7A-43D3-8B79-37D633B846F1}">
+                <asvg:svgBlip xmlns:asvg="http://schemas.microsoft.com/office/drawing/2016/SVG/main" r:embed="rId3"/>
+              </a:ext>
+            </a:extLst>
+          </a:blip>
+          <a:stretch>
+            <a:fillRect/>
+          </a:stretch>
+        </p:blipFill>
+        <p:spPr>
+          <a:xfrm>
+            <a:off x="76200" y="5724525"/>
+            <a:ext cx="1333500" cy="1333500"/>
+          </a:xfrm>
+          <a:prstGeom prst="rect">
+            <a:avLst/>
+          </a:prstGeom>
+        </p:spPr>
+      </p:pic>
+      <p:pic>
+        <p:nvPicPr>
+          <p:cNvPr id="22530" name="Picture 2">
+            <a:extLst>
+              <a:ext uri="{FF2B5EF4-FFF2-40B4-BE49-F238E27FC236}">
+                <a16:creationId xmlns:a16="http://schemas.microsoft.com/office/drawing/2014/main" id="{502535C0-3ABE-D500-A954-E71C32DAA93F}"/>
+              </a:ext>
+            </a:extLst>
+          </p:cNvPr>
+          <p:cNvPicPr>
+            <a:picLocks noChangeAspect="1" noChangeArrowheads="1"/>
+          </p:cNvPicPr>
+          <p:nvPr/>
+        </p:nvPicPr>
+        <p:blipFill rotWithShape="1">
+          <a:blip r:embed="rId4">
+            <a:extLst>
+              <a:ext uri="{28A0092B-C50C-407E-A947-70E740481C1C}">
+                <a14:useLocalDpi xmlns:a14="http://schemas.microsoft.com/office/drawing/2010/main" val="0"/>
+              </a:ext>
+            </a:extLst>
+          </a:blip>
+          <a:srcRect t="43098"/>
+          <a:stretch/>
+        </p:blipFill>
+        <p:spPr bwMode="auto">
+          <a:xfrm>
+            <a:off x="5560446" y="8807"/>
+            <a:ext cx="5750491" cy="6544330"/>
+          </a:xfrm>
+          <a:prstGeom prst="rect">
+            <a:avLst/>
+          </a:prstGeom>
+          <a:noFill/>
+          <a:extLst>
+            <a:ext uri="{909E8E84-426E-40DD-AFC4-6F175D3DCCD1}">
+              <a14:hiddenFill xmlns:a14="http://schemas.microsoft.com/office/drawing/2010/main">
+                <a:solidFill>
+                  <a:srgbClr val="FFFFFF"/>
+                </a:solidFill>
+              </a14:hiddenFill>
+            </a:ext>
+          </a:extLst>
+        </p:spPr>
+      </p:pic>
+      <p:sp>
+        <p:nvSpPr>
+          <p:cNvPr id="8" name="TextBox 7">
+            <a:extLst>
+              <a:ext uri="{FF2B5EF4-FFF2-40B4-BE49-F238E27FC236}">
+                <a16:creationId xmlns:a16="http://schemas.microsoft.com/office/drawing/2014/main" id="{8F1867E6-ED50-DDF4-2277-70BF53757377}"/>
+              </a:ext>
+            </a:extLst>
+          </p:cNvPr>
+          <p:cNvSpPr txBox="1"/>
+          <p:nvPr/>
+        </p:nvSpPr>
+        <p:spPr>
+          <a:xfrm>
+            <a:off x="838200" y="2324100"/>
+            <a:ext cx="3484418" cy="1754326"/>
+          </a:xfrm>
+          <a:prstGeom prst="rect">
+            <a:avLst/>
+          </a:prstGeom>
+          <a:noFill/>
+        </p:spPr>
+        <p:txBody>
+          <a:bodyPr wrap="square" rtlCol="0">
+            <a:spAutoFit/>
+          </a:bodyPr>
+          <a:lstStyle/>
+          <a:p>
+            <a:pPr marL="285750" indent="-285750" algn="l">
+              <a:spcAft>
+                <a:spcPts val="600"/>
+              </a:spcAft>
+              <a:buFont typeface="Arial" panose="020B0604020202020204" pitchFamily="34" charset="0"/>
+              <a:buChar char="•"/>
+            </a:pPr>
+            <a:r>
+              <a:rPr lang="en-US" b="0" dirty="0">
+                <a:solidFill>
+                  <a:srgbClr val="333333"/>
+                </a:solidFill>
+                <a:effectLst/>
+              </a:rPr>
+              <a:t>Many of the individual ratings variables display similar distributions; we noted at this stage that transformations may be required to avoid multicollinearity concerns.</a:t>
+            </a:r>
+            <a:endParaRPr lang="en-US" dirty="0"/>
+          </a:p>
+        </p:txBody>
+      </p:sp>
+    </p:spTree>
+    <p:extLst>
+      <p:ext uri="{BB962C8B-B14F-4D97-AF65-F5344CB8AC3E}">
+        <p14:creationId xmlns:p14="http://schemas.microsoft.com/office/powerpoint/2010/main" val="3872812642"/>
+      </p:ext>
+    </p:extLst>
+  </p:cSld>
+  <p:clrMapOvr>
+    <a:masterClrMapping/>
+  </p:clrMapOvr>
+</p:sld>
+</file>
+
+<file path=ppt/slides/slide14.xml><?xml version="1.0" encoding="utf-8"?>
+<p:sld xmlns:a="http://schemas.openxmlformats.org/drawingml/2006/main" xmlns:r="http://schemas.openxmlformats.org/officeDocument/2006/relationships" xmlns:p="http://schemas.openxmlformats.org/presentationml/2006/main">
+  <p:cSld>
+    <p:spTree>
+      <p:nvGrpSpPr>
+        <p:cNvPr id="1" name=""/>
+        <p:cNvGrpSpPr/>
+        <p:nvPr/>
+      </p:nvGrpSpPr>
+      <p:grpSpPr>
+        <a:xfrm>
+          <a:off x="0" y="0"/>
+          <a:ext cx="0" cy="0"/>
+          <a:chOff x="0" y="0"/>
+          <a:chExt cx="0" cy="0"/>
+        </a:xfrm>
+      </p:grpSpPr>
+      <p:sp>
+        <p:nvSpPr>
+          <p:cNvPr id="2" name="Title 1">
+            <a:extLst>
+              <a:ext uri="{FF2B5EF4-FFF2-40B4-BE49-F238E27FC236}">
                 <a16:creationId xmlns:a16="http://schemas.microsoft.com/office/drawing/2014/main" id="{FB0F54EC-FAA4-0833-DC30-3EAB0F941D84}"/>
               </a:ext>
             </a:extLst>
@@ -4836,7 +5434,7 @@
 </p:sld>
 </file>
 
-<file path=ppt/slides/slide13.xml><?xml version="1.0" encoding="utf-8"?>
+<file path=ppt/slides/slide15.xml><?xml version="1.0" encoding="utf-8"?>
 <p:sld xmlns:a="http://schemas.openxmlformats.org/drawingml/2006/main" xmlns:r="http://schemas.openxmlformats.org/officeDocument/2006/relationships" xmlns:p="http://schemas.openxmlformats.org/presentationml/2006/main">
   <p:cSld>
     <p:spTree>
@@ -5273,7 +5871,7 @@
 </p:sld>
 </file>
 
-<file path=ppt/slides/slide14.xml><?xml version="1.0" encoding="utf-8"?>
+<file path=ppt/slides/slide16.xml><?xml version="1.0" encoding="utf-8"?>
 <p:sld xmlns:a="http://schemas.openxmlformats.org/drawingml/2006/main" xmlns:r="http://schemas.openxmlformats.org/officeDocument/2006/relationships" xmlns:p="http://schemas.openxmlformats.org/presentationml/2006/main">
   <p:cSld>
     <p:spTree>
@@ -5626,7 +6224,7 @@
 </p:sld>
 </file>
 
-<file path=ppt/slides/slide15.xml><?xml version="1.0" encoding="utf-8"?>
+<file path=ppt/slides/slide17.xml><?xml version="1.0" encoding="utf-8"?>
 <p:sld xmlns:a="http://schemas.openxmlformats.org/drawingml/2006/main" xmlns:r="http://schemas.openxmlformats.org/officeDocument/2006/relationships" xmlns:p="http://schemas.openxmlformats.org/presentationml/2006/main">
   <p:cSld>
     <p:spTree>
@@ -6809,1102 +7407,6 @@
 </p:sld>
 </file>
 
-<file path=ppt/slides/slide16.xml><?xml version="1.0" encoding="utf-8"?>
-<p:sld xmlns:a="http://schemas.openxmlformats.org/drawingml/2006/main" xmlns:r="http://schemas.openxmlformats.org/officeDocument/2006/relationships" xmlns:p="http://schemas.openxmlformats.org/presentationml/2006/main">
-  <p:cSld>
-    <p:spTree>
-      <p:nvGrpSpPr>
-        <p:cNvPr id="1" name=""/>
-        <p:cNvGrpSpPr/>
-        <p:nvPr/>
-      </p:nvGrpSpPr>
-      <p:grpSpPr>
-        <a:xfrm>
-          <a:off x="0" y="0"/>
-          <a:ext cx="0" cy="0"/>
-          <a:chOff x="0" y="0"/>
-          <a:chExt cx="0" cy="0"/>
-        </a:xfrm>
-      </p:grpSpPr>
-      <p:sp>
-        <p:nvSpPr>
-          <p:cNvPr id="2" name="Title 1">
-            <a:extLst>
-              <a:ext uri="{FF2B5EF4-FFF2-40B4-BE49-F238E27FC236}">
-                <a16:creationId xmlns:a16="http://schemas.microsoft.com/office/drawing/2014/main" id="{C1B5BF20-6FBB-8A26-98AA-5F714537A2BE}"/>
-              </a:ext>
-            </a:extLst>
-          </p:cNvPr>
-          <p:cNvSpPr>
-            <a:spLocks noGrp="1"/>
-          </p:cNvSpPr>
-          <p:nvPr>
-            <p:ph type="title"/>
-          </p:nvPr>
-        </p:nvSpPr>
-        <p:spPr>
-          <a:xfrm>
-            <a:off x="838200" y="365125"/>
-            <a:ext cx="4328886" cy="1325563"/>
-          </a:xfrm>
-        </p:spPr>
-        <p:txBody>
-          <a:bodyPr>
-            <a:normAutofit fontScale="90000"/>
-          </a:bodyPr>
-          <a:lstStyle/>
-          <a:p>
-            <a:r>
-              <a:rPr lang="en-US" dirty="0"/>
-              <a:t>Aggregated Ratings </a:t>
-            </a:r>
-            <a:br>
-              <a:rPr lang="en-US" dirty="0"/>
-            </a:br>
-            <a:r>
-              <a:rPr lang="en-US" dirty="0"/>
-              <a:t>Variables</a:t>
-            </a:r>
-          </a:p>
-        </p:txBody>
-      </p:sp>
-      <p:pic>
-        <p:nvPicPr>
-          <p:cNvPr id="12290" name="Picture 2">
-            <a:extLst>
-              <a:ext uri="{FF2B5EF4-FFF2-40B4-BE49-F238E27FC236}">
-                <a16:creationId xmlns:a16="http://schemas.microsoft.com/office/drawing/2014/main" id="{6E62147C-20EE-1F68-6DB0-CE9507DBC3D3}"/>
-              </a:ext>
-            </a:extLst>
-          </p:cNvPr>
-          <p:cNvPicPr>
-            <a:picLocks noChangeAspect="1" noChangeArrowheads="1"/>
-          </p:cNvPicPr>
-          <p:nvPr/>
-        </p:nvPicPr>
-        <p:blipFill>
-          <a:blip r:embed="rId2">
-            <a:extLst>
-              <a:ext uri="{28A0092B-C50C-407E-A947-70E740481C1C}">
-                <a14:useLocalDpi xmlns:a14="http://schemas.microsoft.com/office/drawing/2010/main" val="0"/>
-              </a:ext>
-            </a:extLst>
-          </a:blip>
-          <a:srcRect/>
-          <a:stretch>
-            <a:fillRect/>
-          </a:stretch>
-        </p:blipFill>
-        <p:spPr bwMode="auto">
-          <a:xfrm>
-            <a:off x="5334000" y="0"/>
-            <a:ext cx="6858000" cy="6858000"/>
-          </a:xfrm>
-          <a:prstGeom prst="rect">
-            <a:avLst/>
-          </a:prstGeom>
-          <a:noFill/>
-          <a:extLst>
-            <a:ext uri="{909E8E84-426E-40DD-AFC4-6F175D3DCCD1}">
-              <a14:hiddenFill xmlns:a14="http://schemas.microsoft.com/office/drawing/2010/main">
-                <a:solidFill>
-                  <a:srgbClr val="FFFFFF"/>
-                </a:solidFill>
-              </a14:hiddenFill>
-            </a:ext>
-          </a:extLst>
-        </p:spPr>
-      </p:pic>
-      <p:sp>
-        <p:nvSpPr>
-          <p:cNvPr id="5" name="TextBox 4">
-            <a:extLst>
-              <a:ext uri="{FF2B5EF4-FFF2-40B4-BE49-F238E27FC236}">
-                <a16:creationId xmlns:a16="http://schemas.microsoft.com/office/drawing/2014/main" id="{296BA71B-499D-3EAF-E342-D24D313C22B9}"/>
-              </a:ext>
-            </a:extLst>
-          </p:cNvPr>
-          <p:cNvSpPr txBox="1"/>
-          <p:nvPr/>
-        </p:nvSpPr>
-        <p:spPr>
-          <a:xfrm>
-            <a:off x="881063" y="1757878"/>
-            <a:ext cx="3583709" cy="369332"/>
-          </a:xfrm>
-          <a:prstGeom prst="rect">
-            <a:avLst/>
-          </a:prstGeom>
-          <a:noFill/>
-        </p:spPr>
-        <p:txBody>
-          <a:bodyPr wrap="square" rtlCol="0">
-            <a:spAutoFit/>
-          </a:bodyPr>
-          <a:lstStyle/>
-          <a:p>
-            <a:r>
-              <a:rPr lang="en-US" b="1" dirty="0">
-                <a:solidFill>
-                  <a:schemeClr val="bg1">
-                    <a:lumMod val="50000"/>
-                  </a:schemeClr>
-                </a:solidFill>
-              </a:rPr>
-              <a:t>Combined Histogram</a:t>
-            </a:r>
-          </a:p>
-        </p:txBody>
-      </p:sp>
-      <p:sp>
-        <p:nvSpPr>
-          <p:cNvPr id="6" name="TextBox 5">
-            <a:extLst>
-              <a:ext uri="{FF2B5EF4-FFF2-40B4-BE49-F238E27FC236}">
-                <a16:creationId xmlns:a16="http://schemas.microsoft.com/office/drawing/2014/main" id="{9750AE7B-DBAF-BF42-D6A7-32E38BEC747B}"/>
-              </a:ext>
-            </a:extLst>
-          </p:cNvPr>
-          <p:cNvSpPr txBox="1"/>
-          <p:nvPr/>
-        </p:nvSpPr>
-        <p:spPr>
-          <a:xfrm>
-            <a:off x="838200" y="2413337"/>
-            <a:ext cx="4067175" cy="2939266"/>
-          </a:xfrm>
-          <a:prstGeom prst="rect">
-            <a:avLst/>
-          </a:prstGeom>
-          <a:noFill/>
-        </p:spPr>
-        <p:txBody>
-          <a:bodyPr wrap="square">
-            <a:spAutoFit/>
-          </a:bodyPr>
-          <a:lstStyle/>
-          <a:p>
-            <a:pPr marL="285750" indent="-285750">
-              <a:spcAft>
-                <a:spcPts val="600"/>
-              </a:spcAft>
-              <a:buFont typeface="Arial" panose="020B0604020202020204" pitchFamily="34" charset="0"/>
-              <a:buChar char="•"/>
-            </a:pPr>
-            <a:r>
-              <a:rPr lang="en-US" dirty="0">
-                <a:solidFill>
-                  <a:srgbClr val="333333"/>
-                </a:solidFill>
-              </a:rPr>
-              <a:t>When viewing these aggregated ratings, we can see a clear separation in values</a:t>
-            </a:r>
-          </a:p>
-          <a:p>
-            <a:pPr marL="285750" indent="-285750">
-              <a:spcAft>
-                <a:spcPts val="600"/>
-              </a:spcAft>
-              <a:buFont typeface="Arial" panose="020B0604020202020204" pitchFamily="34" charset="0"/>
-              <a:buChar char="•"/>
-            </a:pPr>
-            <a:r>
-              <a:rPr lang="en-US" dirty="0"/>
-              <a:t>The two consolidated ratings variables share a weak positive correlation (correlation coefficient = </a:t>
-            </a:r>
-            <a:r>
-              <a:rPr lang="en-US" b="1" dirty="0"/>
-              <a:t>0.181</a:t>
-            </a:r>
-            <a:r>
-              <a:rPr lang="en-US" dirty="0"/>
-              <a:t>), indicating that they can be jointly included in our model without violating the collinearity assumption to a significant degree.</a:t>
-            </a:r>
-          </a:p>
-        </p:txBody>
-      </p:sp>
-      <p:sp>
-        <p:nvSpPr>
-          <p:cNvPr id="9" name="Isosceles Triangle 8">
-            <a:extLst>
-              <a:ext uri="{FF2B5EF4-FFF2-40B4-BE49-F238E27FC236}">
-                <a16:creationId xmlns:a16="http://schemas.microsoft.com/office/drawing/2014/main" id="{DF520B39-F548-48A7-9A65-9929C1F0C8B8}"/>
-              </a:ext>
-            </a:extLst>
-          </p:cNvPr>
-          <p:cNvSpPr/>
-          <p:nvPr/>
-        </p:nvSpPr>
-        <p:spPr>
-          <a:xfrm rot="10800000" flipH="1" flipV="1">
-            <a:off x="0" y="5724525"/>
-            <a:ext cx="4429125" cy="1133475"/>
-          </a:xfrm>
-          <a:prstGeom prst="triangle">
-            <a:avLst>
-              <a:gd name="adj" fmla="val 0"/>
-            </a:avLst>
-          </a:prstGeom>
-          <a:solidFill>
-            <a:schemeClr val="accent1">
-              <a:lumMod val="40000"/>
-              <a:lumOff val="60000"/>
-            </a:schemeClr>
-          </a:solidFill>
-          <a:ln>
-            <a:solidFill>
-              <a:schemeClr val="tx2">
-                <a:lumMod val="40000"/>
-                <a:lumOff val="60000"/>
-              </a:schemeClr>
-            </a:solidFill>
-          </a:ln>
-        </p:spPr>
-        <p:style>
-          <a:lnRef idx="2">
-            <a:schemeClr val="accent1">
-              <a:shade val="15000"/>
-            </a:schemeClr>
-          </a:lnRef>
-          <a:fillRef idx="1">
-            <a:schemeClr val="accent1"/>
-          </a:fillRef>
-          <a:effectRef idx="0">
-            <a:schemeClr val="accent1"/>
-          </a:effectRef>
-          <a:fontRef idx="minor">
-            <a:schemeClr val="lt1"/>
-          </a:fontRef>
-        </p:style>
-        <p:txBody>
-          <a:bodyPr rtlCol="0" anchor="ctr"/>
-          <a:lstStyle/>
-          <a:p>
-            <a:pPr algn="ctr"/>
-            <a:endParaRPr lang="en-US"/>
-          </a:p>
-        </p:txBody>
-      </p:sp>
-      <p:pic>
-        <p:nvPicPr>
-          <p:cNvPr id="10" name="Graphic 9" descr="Cloud">
-            <a:extLst>
-              <a:ext uri="{FF2B5EF4-FFF2-40B4-BE49-F238E27FC236}">
-                <a16:creationId xmlns:a16="http://schemas.microsoft.com/office/drawing/2014/main" id="{5034F8E5-BB3B-571D-3247-C1C47930932C}"/>
-              </a:ext>
-            </a:extLst>
-          </p:cNvPr>
-          <p:cNvPicPr>
-            <a:picLocks noChangeAspect="1"/>
-          </p:cNvPicPr>
-          <p:nvPr/>
-        </p:nvPicPr>
-        <p:blipFill>
-          <a:blip r:embed="rId3">
-            <a:extLst>
-              <a:ext uri="{28A0092B-C50C-407E-A947-70E740481C1C}">
-                <a14:useLocalDpi xmlns:a14="http://schemas.microsoft.com/office/drawing/2010/main" val="0"/>
-              </a:ext>
-              <a:ext uri="{96DAC541-7B7A-43D3-8B79-37D633B846F1}">
-                <asvg:svgBlip xmlns:asvg="http://schemas.microsoft.com/office/drawing/2016/SVG/main" r:embed="rId4"/>
-              </a:ext>
-            </a:extLst>
-          </a:blip>
-          <a:stretch>
-            <a:fillRect/>
-          </a:stretch>
-        </p:blipFill>
-        <p:spPr>
-          <a:xfrm>
-            <a:off x="76200" y="5724525"/>
-            <a:ext cx="1333500" cy="1333500"/>
-          </a:xfrm>
-          <a:prstGeom prst="rect">
-            <a:avLst/>
-          </a:prstGeom>
-        </p:spPr>
-      </p:pic>
-    </p:spTree>
-    <p:extLst>
-      <p:ext uri="{BB962C8B-B14F-4D97-AF65-F5344CB8AC3E}">
-        <p14:creationId xmlns:p14="http://schemas.microsoft.com/office/powerpoint/2010/main" val="3786834488"/>
-      </p:ext>
-    </p:extLst>
-  </p:cSld>
-  <p:clrMapOvr>
-    <a:masterClrMapping/>
-  </p:clrMapOvr>
-</p:sld>
-</file>
-
-<file path=ppt/slides/slide17.xml><?xml version="1.0" encoding="utf-8"?>
-<p:sld xmlns:a="http://schemas.openxmlformats.org/drawingml/2006/main" xmlns:r="http://schemas.openxmlformats.org/officeDocument/2006/relationships" xmlns:p="http://schemas.openxmlformats.org/presentationml/2006/main">
-  <p:cSld>
-    <p:spTree>
-      <p:nvGrpSpPr>
-        <p:cNvPr id="1" name=""/>
-        <p:cNvGrpSpPr/>
-        <p:nvPr/>
-      </p:nvGrpSpPr>
-      <p:grpSpPr>
-        <a:xfrm>
-          <a:off x="0" y="0"/>
-          <a:ext cx="0" cy="0"/>
-          <a:chOff x="0" y="0"/>
-          <a:chExt cx="0" cy="0"/>
-        </a:xfrm>
-      </p:grpSpPr>
-      <p:sp>
-        <p:nvSpPr>
-          <p:cNvPr id="2" name="Title 1">
-            <a:extLst>
-              <a:ext uri="{FF2B5EF4-FFF2-40B4-BE49-F238E27FC236}">
-                <a16:creationId xmlns:a16="http://schemas.microsoft.com/office/drawing/2014/main" id="{2DCA80F4-B316-38EA-4CCE-BF951290DAF7}"/>
-              </a:ext>
-            </a:extLst>
-          </p:cNvPr>
-          <p:cNvSpPr>
-            <a:spLocks noGrp="1"/>
-          </p:cNvSpPr>
-          <p:nvPr>
-            <p:ph type="title"/>
-          </p:nvPr>
-        </p:nvSpPr>
-        <p:spPr>
-          <a:xfrm>
-            <a:off x="838200" y="365125"/>
-            <a:ext cx="4857750" cy="1325563"/>
-          </a:xfrm>
-        </p:spPr>
-        <p:txBody>
-          <a:bodyPr/>
-          <a:lstStyle/>
-          <a:p>
-            <a:r>
-              <a:rPr lang="en-US" dirty="0"/>
-              <a:t>Ruling Out the Linear Model</a:t>
-            </a:r>
-          </a:p>
-        </p:txBody>
-      </p:sp>
-      <p:sp>
-        <p:nvSpPr>
-          <p:cNvPr id="3" name="TextBox 2">
-            <a:extLst>
-              <a:ext uri="{FF2B5EF4-FFF2-40B4-BE49-F238E27FC236}">
-                <a16:creationId xmlns:a16="http://schemas.microsoft.com/office/drawing/2014/main" id="{A74F6AA0-D4F1-DE1B-29CC-D5686C20066B}"/>
-              </a:ext>
-            </a:extLst>
-          </p:cNvPr>
-          <p:cNvSpPr txBox="1"/>
-          <p:nvPr/>
-        </p:nvSpPr>
-        <p:spPr>
-          <a:xfrm>
-            <a:off x="838200" y="1835214"/>
-            <a:ext cx="4330700" cy="4047262"/>
-          </a:xfrm>
-          <a:prstGeom prst="rect">
-            <a:avLst/>
-          </a:prstGeom>
-          <a:noFill/>
-        </p:spPr>
-        <p:txBody>
-          <a:bodyPr wrap="square">
-            <a:spAutoFit/>
-          </a:bodyPr>
-          <a:lstStyle/>
-          <a:p>
-            <a:pPr marL="285750" indent="-285750">
-              <a:spcAft>
-                <a:spcPts val="600"/>
-              </a:spcAft>
-              <a:buFont typeface="Arial" panose="020B0604020202020204" pitchFamily="34" charset="0"/>
-              <a:buChar char="•"/>
-            </a:pPr>
-            <a:r>
-              <a:rPr lang="en-US" dirty="0">
-                <a:solidFill>
-                  <a:srgbClr val="333333"/>
-                </a:solidFill>
-              </a:rPr>
-              <a:t>Before engaging in further analysis, we first identified that </a:t>
-            </a:r>
-            <a:r>
-              <a:rPr lang="en-US" b="1" dirty="0">
-                <a:solidFill>
-                  <a:srgbClr val="333333"/>
-                </a:solidFill>
-              </a:rPr>
-              <a:t>satisfaction</a:t>
-            </a:r>
-            <a:r>
-              <a:rPr lang="en-US" dirty="0">
-                <a:solidFill>
-                  <a:srgbClr val="333333"/>
-                </a:solidFill>
-              </a:rPr>
-              <a:t>—as a categorical/binary variable—</a:t>
-            </a:r>
-            <a:r>
-              <a:rPr lang="en-US" b="1" dirty="0">
-                <a:solidFill>
-                  <a:srgbClr val="333333"/>
-                </a:solidFill>
-              </a:rPr>
-              <a:t>cannot be reliably predicted through a linear model</a:t>
-            </a:r>
-            <a:r>
-              <a:rPr lang="en-US" dirty="0">
-                <a:solidFill>
-                  <a:srgbClr val="333333"/>
-                </a:solidFill>
-              </a:rPr>
-              <a:t>. We created a rough initial model to demonstrate this roadblock.</a:t>
-            </a:r>
-          </a:p>
-          <a:p>
-            <a:pPr marL="285750" indent="-285750">
-              <a:spcAft>
-                <a:spcPts val="600"/>
-              </a:spcAft>
-              <a:buFont typeface="Arial" panose="020B0604020202020204" pitchFamily="34" charset="0"/>
-              <a:buChar char="•"/>
-            </a:pPr>
-            <a:r>
-              <a:rPr lang="en-US" dirty="0"/>
-              <a:t>We can see that, despite purportedly containing various coefficients of high statistical significance, the linear model is fundamentally incapable of modeling binary output. For various x-values, the linear model predicts unattainable values between satisfied or neutral/dissatisfied (encoded as 1 and 0 respectively).</a:t>
-            </a:r>
-          </a:p>
-        </p:txBody>
-      </p:sp>
-      <p:pic>
-        <p:nvPicPr>
-          <p:cNvPr id="13314" name="Picture 2">
-            <a:extLst>
-              <a:ext uri="{FF2B5EF4-FFF2-40B4-BE49-F238E27FC236}">
-                <a16:creationId xmlns:a16="http://schemas.microsoft.com/office/drawing/2014/main" id="{48BF37C5-CEF4-4B33-3A06-B8BE48DBAA18}"/>
-              </a:ext>
-            </a:extLst>
-          </p:cNvPr>
-          <p:cNvPicPr>
-            <a:picLocks noChangeAspect="1" noChangeArrowheads="1"/>
-          </p:cNvPicPr>
-          <p:nvPr/>
-        </p:nvPicPr>
-        <p:blipFill>
-          <a:blip r:embed="rId2">
-            <a:extLst>
-              <a:ext uri="{28A0092B-C50C-407E-A947-70E740481C1C}">
-                <a14:useLocalDpi xmlns:a14="http://schemas.microsoft.com/office/drawing/2010/main" val="0"/>
-              </a:ext>
-            </a:extLst>
-          </a:blip>
-          <a:srcRect/>
-          <a:stretch>
-            <a:fillRect/>
-          </a:stretch>
-        </p:blipFill>
-        <p:spPr bwMode="auto">
-          <a:xfrm>
-            <a:off x="5419725" y="143328"/>
-            <a:ext cx="6571344" cy="6571344"/>
-          </a:xfrm>
-          <a:prstGeom prst="rect">
-            <a:avLst/>
-          </a:prstGeom>
-          <a:noFill/>
-          <a:extLst>
-            <a:ext uri="{909E8E84-426E-40DD-AFC4-6F175D3DCCD1}">
-              <a14:hiddenFill xmlns:a14="http://schemas.microsoft.com/office/drawing/2010/main">
-                <a:solidFill>
-                  <a:srgbClr val="FFFFFF"/>
-                </a:solidFill>
-              </a14:hiddenFill>
-            </a:ext>
-          </a:extLst>
-        </p:spPr>
-      </p:pic>
-      <p:sp>
-        <p:nvSpPr>
-          <p:cNvPr id="4" name="Rectangle 3">
-            <a:extLst>
-              <a:ext uri="{FF2B5EF4-FFF2-40B4-BE49-F238E27FC236}">
-                <a16:creationId xmlns:a16="http://schemas.microsoft.com/office/drawing/2014/main" id="{DB4523F8-9A24-9895-AF51-C0538884D0B1}"/>
-              </a:ext>
-            </a:extLst>
-          </p:cNvPr>
-          <p:cNvSpPr>
-            <a:spLocks noChangeArrowheads="1"/>
-          </p:cNvSpPr>
-          <p:nvPr/>
-        </p:nvSpPr>
-        <p:spPr bwMode="auto">
-          <a:xfrm>
-            <a:off x="6261102" y="1166405"/>
-            <a:ext cx="3350276" cy="1787649"/>
-          </a:xfrm>
-          <a:prstGeom prst="rect">
-            <a:avLst/>
-          </a:prstGeom>
-          <a:solidFill>
-            <a:srgbClr val="FFFFFF"/>
-          </a:solidFill>
-          <a:ln>
-            <a:noFill/>
-          </a:ln>
-          <a:effectLst/>
-          <a:extLst>
-            <a:ext uri="{91240B29-F687-4F45-9708-019B960494DF}">
-              <a14:hiddenLine xmlns:a14="http://schemas.microsoft.com/office/drawing/2010/main" w="9525">
-                <a:solidFill>
-                  <a:schemeClr val="tx1"/>
-                </a:solidFill>
-                <a:miter lim="800000"/>
-                <a:headEnd/>
-                <a:tailEnd/>
-              </a14:hiddenLine>
-            </a:ext>
-            <a:ext uri="{AF507438-7753-43E0-B8FC-AC1667EBCBE1}">
-              <a14:hiddenEffects xmlns:a14="http://schemas.microsoft.com/office/drawing/2010/main">
-                <a:effectLst>
-                  <a:outerShdw dist="35921" dir="2700000" algn="ctr" rotWithShape="0">
-                    <a:schemeClr val="bg2"/>
-                  </a:outerShdw>
-                </a:effectLst>
-              </a14:hiddenEffects>
-            </a:ext>
-          </a:extLst>
-        </p:spPr>
-        <p:txBody>
-          <a:bodyPr vert="horz" wrap="none" lIns="0" tIns="0" rIns="0" bIns="63480" numCol="1" anchor="ctr" anchorCtr="0" compatLnSpc="1">
-            <a:prstTxWarp prst="textNoShape">
-              <a:avLst/>
-            </a:prstTxWarp>
-            <a:spAutoFit/>
-          </a:bodyPr>
-          <a:lstStyle/>
-          <a:p>
-            <a:pPr marL="0" marR="0" lvl="0" indent="0" algn="l" defTabSz="914400" rtl="0" eaLnBrk="0" fontAlgn="base" latinLnBrk="0" hangingPunct="0">
-              <a:lnSpc>
-                <a:spcPct val="100000"/>
-              </a:lnSpc>
-              <a:spcBef>
-                <a:spcPct val="0"/>
-              </a:spcBef>
-              <a:spcAft>
-                <a:spcPts val="600"/>
-              </a:spcAft>
-              <a:buClrTx/>
-              <a:buSzTx/>
-              <a:buFontTx/>
-              <a:buNone/>
-              <a:tabLst/>
-            </a:pPr>
-            <a:r>
-              <a:rPr kumimoji="0" lang="en-US" altLang="en-US" sz="800" b="0" i="0" u="none" strike="noStrike" cap="none" normalizeH="0" baseline="0" dirty="0">
-                <a:ln>
-                  <a:noFill/>
-                </a:ln>
-                <a:solidFill>
-                  <a:srgbClr val="333333"/>
-                </a:solidFill>
-                <a:effectLst/>
-                <a:latin typeface="Courier New" panose="02070309020205020404" pitchFamily="49" charset="0"/>
-              </a:rPr>
-              <a:t>Coefficients: </a:t>
-            </a:r>
-          </a:p>
-          <a:p>
-            <a:pPr marL="0" marR="0" lvl="0" indent="0" algn="l" defTabSz="914400" rtl="0" eaLnBrk="0" fontAlgn="base" latinLnBrk="0" hangingPunct="0">
-              <a:lnSpc>
-                <a:spcPct val="100000"/>
-              </a:lnSpc>
-              <a:spcBef>
-                <a:spcPct val="0"/>
-              </a:spcBef>
-              <a:spcAft>
-                <a:spcPts val="600"/>
-              </a:spcAft>
-              <a:buClrTx/>
-              <a:buSzTx/>
-              <a:buFontTx/>
-              <a:buNone/>
-              <a:tabLst/>
-            </a:pPr>
-            <a:r>
-              <a:rPr kumimoji="0" lang="en-US" altLang="en-US" sz="800" b="0" i="0" u="none" strike="noStrike" cap="none" normalizeH="0" baseline="0" dirty="0">
-                <a:ln>
-                  <a:noFill/>
-                </a:ln>
-                <a:solidFill>
-                  <a:srgbClr val="333333"/>
-                </a:solidFill>
-                <a:effectLst/>
-                <a:latin typeface="Courier New" panose="02070309020205020404" pitchFamily="49" charset="0"/>
-              </a:rPr>
-              <a:t>## Estimate Std. Error t value </a:t>
-            </a:r>
-            <a:r>
-              <a:rPr kumimoji="0" lang="en-US" altLang="en-US" sz="800" b="0" i="0" u="none" strike="noStrike" cap="none" normalizeH="0" baseline="0" dirty="0" err="1">
-                <a:ln>
-                  <a:noFill/>
-                </a:ln>
-                <a:solidFill>
-                  <a:srgbClr val="333333"/>
-                </a:solidFill>
-                <a:effectLst/>
-                <a:latin typeface="Courier New" panose="02070309020205020404" pitchFamily="49" charset="0"/>
-              </a:rPr>
-              <a:t>Pr</a:t>
-            </a:r>
-            <a:r>
-              <a:rPr kumimoji="0" lang="en-US" altLang="en-US" sz="800" b="0" i="0" u="none" strike="noStrike" cap="none" normalizeH="0" baseline="0" dirty="0">
-                <a:ln>
-                  <a:noFill/>
-                </a:ln>
-                <a:solidFill>
-                  <a:srgbClr val="333333"/>
-                </a:solidFill>
-                <a:effectLst/>
-                <a:latin typeface="Courier New" panose="02070309020205020404" pitchFamily="49" charset="0"/>
-              </a:rPr>
-              <a:t>(&gt;|t|) </a:t>
-            </a:r>
-          </a:p>
-          <a:p>
-            <a:pPr marL="0" marR="0" lvl="0" indent="0" algn="l" defTabSz="914400" rtl="0" eaLnBrk="0" fontAlgn="base" latinLnBrk="0" hangingPunct="0">
-              <a:lnSpc>
-                <a:spcPct val="100000"/>
-              </a:lnSpc>
-              <a:spcBef>
-                <a:spcPct val="0"/>
-              </a:spcBef>
-              <a:spcAft>
-                <a:spcPts val="600"/>
-              </a:spcAft>
-              <a:buClrTx/>
-              <a:buSzTx/>
-              <a:buFontTx/>
-              <a:buNone/>
-              <a:tabLst/>
-            </a:pPr>
-            <a:r>
-              <a:rPr kumimoji="0" lang="en-US" altLang="en-US" sz="800" b="0" i="0" u="none" strike="noStrike" cap="none" normalizeH="0" baseline="0" dirty="0">
-                <a:ln>
-                  <a:noFill/>
-                </a:ln>
-                <a:solidFill>
-                  <a:srgbClr val="333333"/>
-                </a:solidFill>
-                <a:effectLst/>
-                <a:latin typeface="Courier New" panose="02070309020205020404" pitchFamily="49" charset="0"/>
-              </a:rPr>
-              <a:t>## (Intercept) -3.69e-01 5.04e-03 -73.15 &lt; 2e-16 *** </a:t>
-            </a:r>
-          </a:p>
-          <a:p>
-            <a:pPr marL="0" marR="0" lvl="0" indent="0" algn="l" defTabSz="914400" rtl="0" eaLnBrk="0" fontAlgn="base" latinLnBrk="0" hangingPunct="0">
-              <a:lnSpc>
-                <a:spcPct val="100000"/>
-              </a:lnSpc>
-              <a:spcBef>
-                <a:spcPct val="0"/>
-              </a:spcBef>
-              <a:spcAft>
-                <a:spcPts val="600"/>
-              </a:spcAft>
-              <a:buClrTx/>
-              <a:buSzTx/>
-              <a:buFontTx/>
-              <a:buNone/>
-              <a:tabLst/>
-            </a:pPr>
-            <a:r>
-              <a:rPr kumimoji="0" lang="en-US" altLang="en-US" sz="800" b="0" i="0" u="none" strike="noStrike" cap="none" normalizeH="0" baseline="0" dirty="0">
-                <a:ln>
-                  <a:noFill/>
-                </a:ln>
-                <a:solidFill>
-                  <a:srgbClr val="333333"/>
-                </a:solidFill>
-                <a:effectLst/>
-                <a:latin typeface="Courier New" panose="02070309020205020404" pitchFamily="49" charset="0"/>
-              </a:rPr>
-              <a:t>## Gender 2.92e-03 2.51e-03 1.17 0.24 </a:t>
-            </a:r>
-          </a:p>
-          <a:p>
-            <a:pPr marL="0" marR="0" lvl="0" indent="0" algn="l" defTabSz="914400" rtl="0" eaLnBrk="0" fontAlgn="base" latinLnBrk="0" hangingPunct="0">
-              <a:lnSpc>
-                <a:spcPct val="100000"/>
-              </a:lnSpc>
-              <a:spcBef>
-                <a:spcPct val="0"/>
-              </a:spcBef>
-              <a:spcAft>
-                <a:spcPts val="600"/>
-              </a:spcAft>
-              <a:buClrTx/>
-              <a:buSzTx/>
-              <a:buFontTx/>
-              <a:buNone/>
-              <a:tabLst/>
-            </a:pPr>
-            <a:r>
-              <a:rPr kumimoji="0" lang="en-US" altLang="en-US" sz="800" b="0" i="0" u="none" strike="noStrike" cap="none" normalizeH="0" baseline="0" dirty="0">
-                <a:ln>
-                  <a:noFill/>
-                </a:ln>
-                <a:solidFill>
-                  <a:srgbClr val="333333"/>
-                </a:solidFill>
-                <a:effectLst/>
-                <a:latin typeface="Courier New" panose="02070309020205020404" pitchFamily="49" charset="0"/>
-              </a:rPr>
-              <a:t>## </a:t>
-            </a:r>
-            <a:r>
-              <a:rPr kumimoji="0" lang="en-US" altLang="en-US" sz="800" b="0" i="0" u="none" strike="noStrike" cap="none" normalizeH="0" baseline="0" dirty="0" err="1">
-                <a:ln>
-                  <a:noFill/>
-                </a:ln>
-                <a:solidFill>
-                  <a:srgbClr val="333333"/>
-                </a:solidFill>
-                <a:effectLst/>
-                <a:latin typeface="Courier New" panose="02070309020205020404" pitchFamily="49" charset="0"/>
-              </a:rPr>
-              <a:t>Customer.Type</a:t>
-            </a:r>
-            <a:r>
-              <a:rPr kumimoji="0" lang="en-US" altLang="en-US" sz="800" b="0" i="0" u="none" strike="noStrike" cap="none" normalizeH="0" baseline="0" dirty="0">
-                <a:ln>
-                  <a:noFill/>
-                </a:ln>
-                <a:solidFill>
-                  <a:srgbClr val="333333"/>
-                </a:solidFill>
-                <a:effectLst/>
-                <a:latin typeface="Courier New" panose="02070309020205020404" pitchFamily="49" charset="0"/>
-              </a:rPr>
-              <a:t> 4.10e-01 3.96e-03 103.42 &lt; 2e-16 *** </a:t>
-            </a:r>
-          </a:p>
-          <a:p>
-            <a:pPr marL="0" marR="0" lvl="0" indent="0" algn="l" defTabSz="914400" rtl="0" eaLnBrk="0" fontAlgn="base" latinLnBrk="0" hangingPunct="0">
-              <a:lnSpc>
-                <a:spcPct val="100000"/>
-              </a:lnSpc>
-              <a:spcBef>
-                <a:spcPct val="0"/>
-              </a:spcBef>
-              <a:spcAft>
-                <a:spcPts val="600"/>
-              </a:spcAft>
-              <a:buClrTx/>
-              <a:buSzTx/>
-              <a:buFontTx/>
-              <a:buNone/>
-              <a:tabLst/>
-            </a:pPr>
-            <a:r>
-              <a:rPr kumimoji="0" lang="en-US" altLang="en-US" sz="800" b="0" i="0" u="none" strike="noStrike" cap="none" normalizeH="0" baseline="0" dirty="0">
-                <a:ln>
-                  <a:noFill/>
-                </a:ln>
-                <a:solidFill>
-                  <a:srgbClr val="333333"/>
-                </a:solidFill>
-                <a:effectLst/>
-                <a:latin typeface="Courier New" panose="02070309020205020404" pitchFamily="49" charset="0"/>
-              </a:rPr>
-              <a:t>## Age 5.34e-04 8.72e-05 6.12 9.4e-10 *** </a:t>
-            </a:r>
-          </a:p>
-          <a:p>
-            <a:pPr marL="0" marR="0" lvl="0" indent="0" algn="l" defTabSz="914400" rtl="0" eaLnBrk="0" fontAlgn="base" latinLnBrk="0" hangingPunct="0">
-              <a:lnSpc>
-                <a:spcPct val="100000"/>
-              </a:lnSpc>
-              <a:spcBef>
-                <a:spcPct val="0"/>
-              </a:spcBef>
-              <a:spcAft>
-                <a:spcPts val="600"/>
-              </a:spcAft>
-              <a:buClrTx/>
-              <a:buSzTx/>
-              <a:buFontTx/>
-              <a:buNone/>
-              <a:tabLst/>
-            </a:pPr>
-            <a:r>
-              <a:rPr kumimoji="0" lang="en-US" altLang="en-US" sz="800" b="0" i="0" u="none" strike="noStrike" cap="none" normalizeH="0" baseline="0" dirty="0">
-                <a:ln>
-                  <a:noFill/>
-                </a:ln>
-                <a:solidFill>
-                  <a:srgbClr val="333333"/>
-                </a:solidFill>
-                <a:effectLst/>
-                <a:latin typeface="Courier New" panose="02070309020205020404" pitchFamily="49" charset="0"/>
-              </a:rPr>
-              <a:t>## </a:t>
-            </a:r>
-            <a:r>
-              <a:rPr kumimoji="0" lang="en-US" altLang="en-US" sz="800" b="0" i="0" u="none" strike="noStrike" cap="none" normalizeH="0" baseline="0" dirty="0" err="1">
-                <a:ln>
-                  <a:noFill/>
-                </a:ln>
-                <a:solidFill>
-                  <a:srgbClr val="333333"/>
-                </a:solidFill>
-                <a:effectLst/>
-                <a:latin typeface="Courier New" panose="02070309020205020404" pitchFamily="49" charset="0"/>
-              </a:rPr>
-              <a:t>Type.of.Travel</a:t>
-            </a:r>
-            <a:r>
-              <a:rPr kumimoji="0" lang="en-US" altLang="en-US" sz="800" b="0" i="0" u="none" strike="noStrike" cap="none" normalizeH="0" baseline="0" dirty="0">
-                <a:ln>
-                  <a:noFill/>
-                </a:ln>
-                <a:solidFill>
-                  <a:srgbClr val="333333"/>
-                </a:solidFill>
-                <a:effectLst/>
-                <a:latin typeface="Courier New" panose="02070309020205020404" pitchFamily="49" charset="0"/>
-              </a:rPr>
-              <a:t> 4.34e-01 3.61e-03 120.27 &lt; 2e-16 *** </a:t>
-            </a:r>
-          </a:p>
-          <a:p>
-            <a:pPr marL="0" marR="0" lvl="0" indent="0" algn="l" defTabSz="914400" rtl="0" eaLnBrk="0" fontAlgn="base" latinLnBrk="0" hangingPunct="0">
-              <a:lnSpc>
-                <a:spcPct val="100000"/>
-              </a:lnSpc>
-              <a:spcBef>
-                <a:spcPct val="0"/>
-              </a:spcBef>
-              <a:spcAft>
-                <a:spcPts val="600"/>
-              </a:spcAft>
-              <a:buClrTx/>
-              <a:buSzTx/>
-              <a:buFontTx/>
-              <a:buNone/>
-              <a:tabLst/>
-            </a:pPr>
-            <a:r>
-              <a:rPr kumimoji="0" lang="en-US" altLang="en-US" sz="800" b="0" i="0" u="none" strike="noStrike" cap="none" normalizeH="0" baseline="0" dirty="0">
-                <a:ln>
-                  <a:noFill/>
-                </a:ln>
-                <a:solidFill>
-                  <a:srgbClr val="333333"/>
-                </a:solidFill>
-                <a:effectLst/>
-                <a:latin typeface="Courier New" panose="02070309020205020404" pitchFamily="49" charset="0"/>
-              </a:rPr>
-              <a:t>## Class 2.42e-01 3.38e-03 71.81 &lt; 2e-16 *** </a:t>
-            </a:r>
-          </a:p>
-          <a:p>
-            <a:pPr marL="0" marR="0" lvl="0" indent="0" algn="l" defTabSz="914400" rtl="0" eaLnBrk="0" fontAlgn="base" latinLnBrk="0" hangingPunct="0">
-              <a:lnSpc>
-                <a:spcPct val="100000"/>
-              </a:lnSpc>
-              <a:spcBef>
-                <a:spcPct val="0"/>
-              </a:spcBef>
-              <a:spcAft>
-                <a:spcPts val="600"/>
-              </a:spcAft>
-              <a:buClrTx/>
-              <a:buSzTx/>
-              <a:buFontTx/>
-              <a:buNone/>
-              <a:tabLst/>
-            </a:pPr>
-            <a:r>
-              <a:rPr kumimoji="0" lang="en-US" altLang="en-US" sz="800" b="0" i="0" u="none" strike="noStrike" cap="none" normalizeH="0" baseline="0" dirty="0">
-                <a:ln>
-                  <a:noFill/>
-                </a:ln>
-                <a:solidFill>
-                  <a:srgbClr val="333333"/>
-                </a:solidFill>
-                <a:effectLst/>
-                <a:latin typeface="Courier New" panose="02070309020205020404" pitchFamily="49" charset="0"/>
-              </a:rPr>
-              <a:t>## </a:t>
-            </a:r>
-            <a:r>
-              <a:rPr kumimoji="0" lang="en-US" altLang="en-US" sz="800" b="0" i="0" u="none" strike="noStrike" cap="none" normalizeH="0" baseline="0" dirty="0" err="1">
-                <a:ln>
-                  <a:noFill/>
-                </a:ln>
-                <a:solidFill>
-                  <a:srgbClr val="333333"/>
-                </a:solidFill>
-                <a:effectLst/>
-                <a:latin typeface="Courier New" panose="02070309020205020404" pitchFamily="49" charset="0"/>
-              </a:rPr>
-              <a:t>Flight.Distance</a:t>
-            </a:r>
-            <a:r>
-              <a:rPr kumimoji="0" lang="en-US" altLang="en-US" sz="800" b="0" i="0" u="none" strike="noStrike" cap="none" normalizeH="0" baseline="0" dirty="0">
-                <a:ln>
-                  <a:noFill/>
-                </a:ln>
-                <a:solidFill>
-                  <a:srgbClr val="333333"/>
-                </a:solidFill>
-                <a:effectLst/>
-                <a:latin typeface="Courier New" panose="02070309020205020404" pitchFamily="49" charset="0"/>
-              </a:rPr>
-              <a:t> 8.38e-06 1.45e-06 5.77 8.1e-09 ***</a:t>
-            </a:r>
-            <a:r>
-              <a:rPr kumimoji="0" lang="en-US" altLang="en-US" sz="800" b="0" i="0" u="none" strike="noStrike" cap="none" normalizeH="0" baseline="0" dirty="0">
-                <a:ln>
-                  <a:noFill/>
-                </a:ln>
-                <a:solidFill>
-                  <a:schemeClr val="tx1"/>
-                </a:solidFill>
-                <a:effectLst/>
-              </a:rPr>
-              <a:t> </a:t>
-            </a:r>
-            <a:endParaRPr kumimoji="0" lang="en-US" altLang="en-US" sz="800" b="0" i="0" u="none" strike="noStrike" cap="none" normalizeH="0" baseline="0" dirty="0">
-              <a:ln>
-                <a:noFill/>
-              </a:ln>
-              <a:solidFill>
-                <a:schemeClr val="tx1"/>
-              </a:solidFill>
-              <a:effectLst/>
-              <a:latin typeface="Arial" panose="020B0604020202020204" pitchFamily="34" charset="0"/>
-            </a:endParaRPr>
-          </a:p>
-        </p:txBody>
-      </p:sp>
-      <p:sp>
-        <p:nvSpPr>
-          <p:cNvPr id="5" name="Isosceles Triangle 4">
-            <a:extLst>
-              <a:ext uri="{FF2B5EF4-FFF2-40B4-BE49-F238E27FC236}">
-                <a16:creationId xmlns:a16="http://schemas.microsoft.com/office/drawing/2014/main" id="{AEAE6FC0-75E8-6CE0-E76B-8E1477D4CC6A}"/>
-              </a:ext>
-            </a:extLst>
-          </p:cNvPr>
-          <p:cNvSpPr/>
-          <p:nvPr/>
-        </p:nvSpPr>
-        <p:spPr>
-          <a:xfrm rot="10800000" flipH="1" flipV="1">
-            <a:off x="0" y="5724525"/>
-            <a:ext cx="4429125" cy="1133475"/>
-          </a:xfrm>
-          <a:prstGeom prst="triangle">
-            <a:avLst>
-              <a:gd name="adj" fmla="val 0"/>
-            </a:avLst>
-          </a:prstGeom>
-          <a:solidFill>
-            <a:schemeClr val="accent1">
-              <a:lumMod val="40000"/>
-              <a:lumOff val="60000"/>
-            </a:schemeClr>
-          </a:solidFill>
-          <a:ln>
-            <a:solidFill>
-              <a:schemeClr val="tx2">
-                <a:lumMod val="40000"/>
-                <a:lumOff val="60000"/>
-              </a:schemeClr>
-            </a:solidFill>
-          </a:ln>
-        </p:spPr>
-        <p:style>
-          <a:lnRef idx="2">
-            <a:schemeClr val="accent1">
-              <a:shade val="15000"/>
-            </a:schemeClr>
-          </a:lnRef>
-          <a:fillRef idx="1">
-            <a:schemeClr val="accent1"/>
-          </a:fillRef>
-          <a:effectRef idx="0">
-            <a:schemeClr val="accent1"/>
-          </a:effectRef>
-          <a:fontRef idx="minor">
-            <a:schemeClr val="lt1"/>
-          </a:fontRef>
-        </p:style>
-        <p:txBody>
-          <a:bodyPr rtlCol="0" anchor="ctr"/>
-          <a:lstStyle/>
-          <a:p>
-            <a:pPr algn="ctr"/>
-            <a:endParaRPr lang="en-US"/>
-          </a:p>
-        </p:txBody>
-      </p:sp>
-      <p:pic>
-        <p:nvPicPr>
-          <p:cNvPr id="6" name="Graphic 5" descr="Cloud">
-            <a:extLst>
-              <a:ext uri="{FF2B5EF4-FFF2-40B4-BE49-F238E27FC236}">
-                <a16:creationId xmlns:a16="http://schemas.microsoft.com/office/drawing/2014/main" id="{BEDF8DD6-1808-AB72-D919-10F43439180E}"/>
-              </a:ext>
-            </a:extLst>
-          </p:cNvPr>
-          <p:cNvPicPr>
-            <a:picLocks noChangeAspect="1"/>
-          </p:cNvPicPr>
-          <p:nvPr/>
-        </p:nvPicPr>
-        <p:blipFill>
-          <a:blip r:embed="rId3">
-            <a:extLst>
-              <a:ext uri="{28A0092B-C50C-407E-A947-70E740481C1C}">
-                <a14:useLocalDpi xmlns:a14="http://schemas.microsoft.com/office/drawing/2010/main" val="0"/>
-              </a:ext>
-              <a:ext uri="{96DAC541-7B7A-43D3-8B79-37D633B846F1}">
-                <asvg:svgBlip xmlns:asvg="http://schemas.microsoft.com/office/drawing/2016/SVG/main" r:embed="rId4"/>
-              </a:ext>
-            </a:extLst>
-          </a:blip>
-          <a:stretch>
-            <a:fillRect/>
-          </a:stretch>
-        </p:blipFill>
-        <p:spPr>
-          <a:xfrm>
-            <a:off x="76200" y="5724525"/>
-            <a:ext cx="1333500" cy="1333500"/>
-          </a:xfrm>
-          <a:prstGeom prst="rect">
-            <a:avLst/>
-          </a:prstGeom>
-        </p:spPr>
-      </p:pic>
-    </p:spTree>
-    <p:extLst>
-      <p:ext uri="{BB962C8B-B14F-4D97-AF65-F5344CB8AC3E}">
-        <p14:creationId xmlns:p14="http://schemas.microsoft.com/office/powerpoint/2010/main" val="2613039472"/>
-      </p:ext>
-    </p:extLst>
-  </p:cSld>
-  <p:clrMapOvr>
-    <a:masterClrMapping/>
-  </p:clrMapOvr>
-</p:sld>
-</file>
-
 <file path=ppt/slides/slide18.xml><?xml version="1.0" encoding="utf-8"?>
 <p:sld xmlns:a="http://schemas.openxmlformats.org/drawingml/2006/main" xmlns:r="http://schemas.openxmlformats.org/officeDocument/2006/relationships" xmlns:p="http://schemas.openxmlformats.org/presentationml/2006/main">
   <p:cSld>
@@ -7927,7 +7429,7 @@
           <p:cNvPr id="2" name="Title 1">
             <a:extLst>
               <a:ext uri="{FF2B5EF4-FFF2-40B4-BE49-F238E27FC236}">
-                <a16:creationId xmlns:a16="http://schemas.microsoft.com/office/drawing/2014/main" id="{059D2A06-5A87-324C-B6BA-3025A3E04A92}"/>
+                <a16:creationId xmlns:a16="http://schemas.microsoft.com/office/drawing/2014/main" id="{C1B5BF20-6FBB-8A26-98AA-5F714537A2BE}"/>
               </a:ext>
             </a:extLst>
           </p:cNvPr>
@@ -7938,24 +7440,85 @@
             <p:ph type="title"/>
           </p:nvPr>
         </p:nvSpPr>
-        <p:spPr/>
+        <p:spPr>
+          <a:xfrm>
+            <a:off x="838200" y="365125"/>
+            <a:ext cx="4328886" cy="1325563"/>
+          </a:xfrm>
+        </p:spPr>
         <p:txBody>
-          <a:bodyPr/>
+          <a:bodyPr>
+            <a:normAutofit fontScale="90000"/>
+          </a:bodyPr>
           <a:lstStyle/>
           <a:p>
             <a:r>
               <a:rPr lang="en-US" dirty="0"/>
-              <a:t>Logistic Regression</a:t>
+              <a:t>Aggregated Ratings </a:t>
+            </a:r>
+            <a:br>
+              <a:rPr lang="en-US" dirty="0"/>
+            </a:br>
+            <a:r>
+              <a:rPr lang="en-US" dirty="0"/>
+              <a:t>Variables</a:t>
             </a:r>
           </a:p>
         </p:txBody>
       </p:sp>
+      <p:pic>
+        <p:nvPicPr>
+          <p:cNvPr id="12290" name="Picture 2">
+            <a:extLst>
+              <a:ext uri="{FF2B5EF4-FFF2-40B4-BE49-F238E27FC236}">
+                <a16:creationId xmlns:a16="http://schemas.microsoft.com/office/drawing/2014/main" id="{6E62147C-20EE-1F68-6DB0-CE9507DBC3D3}"/>
+              </a:ext>
+            </a:extLst>
+          </p:cNvPr>
+          <p:cNvPicPr>
+            <a:picLocks noChangeAspect="1" noChangeArrowheads="1"/>
+          </p:cNvPicPr>
+          <p:nvPr/>
+        </p:nvPicPr>
+        <p:blipFill>
+          <a:blip r:embed="rId2">
+            <a:extLst>
+              <a:ext uri="{28A0092B-C50C-407E-A947-70E740481C1C}">
+                <a14:useLocalDpi xmlns:a14="http://schemas.microsoft.com/office/drawing/2010/main" val="0"/>
+              </a:ext>
+            </a:extLst>
+          </a:blip>
+          <a:srcRect/>
+          <a:stretch>
+            <a:fillRect/>
+          </a:stretch>
+        </p:blipFill>
+        <p:spPr bwMode="auto">
+          <a:xfrm>
+            <a:off x="5334000" y="0"/>
+            <a:ext cx="6858000" cy="6858000"/>
+          </a:xfrm>
+          <a:prstGeom prst="rect">
+            <a:avLst/>
+          </a:prstGeom>
+          <a:noFill/>
+          <a:extLst>
+            <a:ext uri="{909E8E84-426E-40DD-AFC4-6F175D3DCCD1}">
+              <a14:hiddenFill xmlns:a14="http://schemas.microsoft.com/office/drawing/2010/main">
+                <a:solidFill>
+                  <a:srgbClr val="FFFFFF"/>
+                </a:solidFill>
+              </a14:hiddenFill>
+            </a:ext>
+          </a:extLst>
+        </p:spPr>
+      </p:pic>
       <p:sp>
         <p:nvSpPr>
-          <p:cNvPr id="3" name="TextBox 2">
-            <a:extLst>
-              <a:ext uri="{FF2B5EF4-FFF2-40B4-BE49-F238E27FC236}">
-                <a16:creationId xmlns:a16="http://schemas.microsoft.com/office/drawing/2014/main" id="{24B166E6-D4CE-0AE2-4B34-CFF0CDE1A04F}"/>
+          <p:cNvPr id="5" name="TextBox 4">
+            <a:extLst>
+              <a:ext uri="{FF2B5EF4-FFF2-40B4-BE49-F238E27FC236}">
+                <a16:creationId xmlns:a16="http://schemas.microsoft.com/office/drawing/2014/main" id="{296BA71B-499D-3EAF-E342-D24D313C22B9}"/>
               </a:ext>
             </a:extLst>
           </p:cNvPr>
@@ -7964,8 +7527,49 @@
         </p:nvSpPr>
         <p:spPr>
           <a:xfrm>
-            <a:off x="838200" y="1690688"/>
-            <a:ext cx="9525000" cy="923330"/>
+            <a:off x="881063" y="1757878"/>
+            <a:ext cx="3583709" cy="369332"/>
+          </a:xfrm>
+          <a:prstGeom prst="rect">
+            <a:avLst/>
+          </a:prstGeom>
+          <a:noFill/>
+        </p:spPr>
+        <p:txBody>
+          <a:bodyPr wrap="square" rtlCol="0">
+            <a:spAutoFit/>
+          </a:bodyPr>
+          <a:lstStyle/>
+          <a:p>
+            <a:r>
+              <a:rPr lang="en-US" b="1" dirty="0">
+                <a:solidFill>
+                  <a:schemeClr val="bg1">
+                    <a:lumMod val="50000"/>
+                  </a:schemeClr>
+                </a:solidFill>
+              </a:rPr>
+              <a:t>Combined Histogram</a:t>
+            </a:r>
+          </a:p>
+        </p:txBody>
+      </p:sp>
+      <p:sp>
+        <p:nvSpPr>
+          <p:cNvPr id="6" name="TextBox 5">
+            <a:extLst>
+              <a:ext uri="{FF2B5EF4-FFF2-40B4-BE49-F238E27FC236}">
+                <a16:creationId xmlns:a16="http://schemas.microsoft.com/office/drawing/2014/main" id="{9750AE7B-DBAF-BF42-D6A7-32E38BEC747B}"/>
+              </a:ext>
+            </a:extLst>
+          </p:cNvPr>
+          <p:cNvSpPr txBox="1"/>
+          <p:nvPr/>
+        </p:nvSpPr>
+        <p:spPr>
+          <a:xfrm>
+            <a:off x="838200" y="2413337"/>
+            <a:ext cx="4067175" cy="2939266"/>
           </a:xfrm>
           <a:prstGeom prst="rect">
             <a:avLst/>
@@ -7977,65 +7581,6 @@
             <a:spAutoFit/>
           </a:bodyPr>
           <a:lstStyle/>
-          <a:p>
-            <a:pPr>
-              <a:spcAft>
-                <a:spcPts val="600"/>
-              </a:spcAft>
-            </a:pPr>
-            <a:r>
-              <a:rPr lang="en-US" dirty="0">
-                <a:solidFill>
-                  <a:srgbClr val="333333"/>
-                </a:solidFill>
-              </a:rPr>
-              <a:t>Rather than a linear model, we will evaluate and prepare the data for use in a logistic regression, which predicts the log odds of satisfaction. Such models utilize different assumptions relative to linear models, significantly altering the necessary EDA steps.</a:t>
-            </a:r>
-          </a:p>
-        </p:txBody>
-      </p:sp>
-      <p:sp>
-        <p:nvSpPr>
-          <p:cNvPr id="5" name="TextBox 4">
-            <a:extLst>
-              <a:ext uri="{FF2B5EF4-FFF2-40B4-BE49-F238E27FC236}">
-                <a16:creationId xmlns:a16="http://schemas.microsoft.com/office/drawing/2014/main" id="{C577FEF2-B7C5-29ED-A509-B06085C94146}"/>
-              </a:ext>
-            </a:extLst>
-          </p:cNvPr>
-          <p:cNvSpPr txBox="1"/>
-          <p:nvPr/>
-        </p:nvSpPr>
-        <p:spPr>
-          <a:xfrm>
-            <a:off x="3486150" y="3275077"/>
-            <a:ext cx="7867650" cy="2970044"/>
-          </a:xfrm>
-          <a:prstGeom prst="rect">
-            <a:avLst/>
-          </a:prstGeom>
-          <a:noFill/>
-        </p:spPr>
-        <p:txBody>
-          <a:bodyPr wrap="square">
-            <a:spAutoFit/>
-          </a:bodyPr>
-          <a:lstStyle/>
-          <a:p>
-            <a:pPr>
-              <a:spcAft>
-                <a:spcPts val="600"/>
-              </a:spcAft>
-            </a:pPr>
-            <a:r>
-              <a:rPr lang="en-US" dirty="0">
-                <a:solidFill>
-                  <a:srgbClr val="333333"/>
-                </a:solidFill>
-              </a:rPr>
-              <a:t>Assumptions are altered as follows:</a:t>
-            </a:r>
-          </a:p>
           <a:p>
             <a:pPr marL="285750" indent="-285750">
               <a:spcAft>
@@ -8045,20 +7590,12 @@
               <a:buChar char="•"/>
             </a:pPr>
             <a:r>
-              <a:rPr lang="en-US" b="1" dirty="0">
+              <a:rPr lang="en-US" dirty="0">
                 <a:solidFill>
                   <a:srgbClr val="333333"/>
                 </a:solidFill>
               </a:rPr>
-              <a:t>Linearity</a:t>
-            </a:r>
-            <a:r>
-              <a:rPr lang="en-US" dirty="0">
-                <a:solidFill>
-                  <a:srgbClr val="333333"/>
-                </a:solidFill>
-              </a:rPr>
-              <a:t>: Rather than a linear relationship between parameters and the dependent variable, logistic regression assumes a linear relationship between parameters and the log odds</a:t>
+              <a:t>When viewing these aggregated ratings, we can see a clear separation in values</a:t>
             </a:r>
           </a:p>
           <a:p>
@@ -8070,106 +7607,26 @@
               <a:buChar char="•"/>
             </a:pPr>
             <a:r>
-              <a:rPr lang="en-US" b="1" dirty="0">
-                <a:solidFill>
-                  <a:srgbClr val="333333"/>
-                </a:solidFill>
-              </a:rPr>
-              <a:t>Independence of Errors</a:t>
-            </a:r>
-            <a:r>
-              <a:rPr lang="en-US" dirty="0">
-                <a:solidFill>
-                  <a:srgbClr val="333333"/>
-                </a:solidFill>
-              </a:rPr>
-              <a:t>: Remains as an assumption for both linear and logistic models</a:t>
-            </a:r>
-          </a:p>
-          <a:p>
-            <a:pPr marL="285750" indent="-285750">
-              <a:spcAft>
-                <a:spcPts val="600"/>
-              </a:spcAft>
-              <a:buFont typeface="Arial" panose="020B0604020202020204" pitchFamily="34" charset="0"/>
-              <a:buChar char="•"/>
-            </a:pPr>
-            <a:r>
-              <a:rPr lang="en-US" b="1" dirty="0">
-                <a:solidFill>
-                  <a:srgbClr val="333333"/>
-                </a:solidFill>
-              </a:rPr>
-              <a:t>Homoscedasticity</a:t>
-            </a:r>
-            <a:r>
-              <a:rPr lang="en-US" dirty="0">
-                <a:solidFill>
-                  <a:srgbClr val="333333"/>
-                </a:solidFill>
-              </a:rPr>
-              <a:t>: Not required under logistic regression</a:t>
-            </a:r>
-          </a:p>
-          <a:p>
-            <a:pPr marL="285750" indent="-285750">
-              <a:spcAft>
-                <a:spcPts val="600"/>
-              </a:spcAft>
-              <a:buFont typeface="Arial" panose="020B0604020202020204" pitchFamily="34" charset="0"/>
-              <a:buChar char="•"/>
-            </a:pPr>
-            <a:r>
-              <a:rPr lang="en-US" b="1" dirty="0">
-                <a:solidFill>
-                  <a:srgbClr val="333333"/>
-                </a:solidFill>
-              </a:rPr>
-              <a:t>Normally distributed residuals</a:t>
-            </a:r>
-            <a:r>
-              <a:rPr lang="en-US" dirty="0">
-                <a:solidFill>
-                  <a:srgbClr val="333333"/>
-                </a:solidFill>
-              </a:rPr>
-              <a:t>: Not required under logistic regression</a:t>
-            </a:r>
-          </a:p>
-          <a:p>
-            <a:pPr marL="285750" indent="-285750">
-              <a:spcAft>
-                <a:spcPts val="600"/>
-              </a:spcAft>
-              <a:buFont typeface="Arial" panose="020B0604020202020204" pitchFamily="34" charset="0"/>
-              <a:buChar char="•"/>
-            </a:pPr>
-            <a:r>
-              <a:rPr lang="en-US" b="1" dirty="0">
-                <a:solidFill>
-                  <a:srgbClr val="333333"/>
-                </a:solidFill>
-              </a:rPr>
-              <a:t>Multicollinearity</a:t>
-            </a:r>
-            <a:r>
-              <a:rPr lang="en-US" dirty="0">
-                <a:solidFill>
-                  <a:srgbClr val="333333"/>
-                </a:solidFill>
-              </a:rPr>
-              <a:t>: Remains as an assumption for both linear and logistic models</a:t>
-            </a:r>
-            <a:endParaRPr lang="en-US" dirty="0"/>
+              <a:rPr lang="en-US" dirty="0"/>
+              <a:t>The two consolidated ratings variables share a weak positive correlation (correlation coefficient = </a:t>
+            </a:r>
+            <a:r>
+              <a:rPr lang="en-US" b="1" dirty="0"/>
+              <a:t>0.181</a:t>
+            </a:r>
+            <a:r>
+              <a:rPr lang="en-US" dirty="0"/>
+              <a:t>), indicating that they can be jointly included in our model without violating the collinearity assumption to a significant degree.</a:t>
+            </a:r>
           </a:p>
         </p:txBody>
       </p:sp>
       <p:sp>
         <p:nvSpPr>
-          <p:cNvPr id="7" name="Isosceles Triangle 6">
-            <a:extLst>
-              <a:ext uri="{FF2B5EF4-FFF2-40B4-BE49-F238E27FC236}">
-                <a16:creationId xmlns:a16="http://schemas.microsoft.com/office/drawing/2014/main" id="{28A61623-7A8C-F95D-B241-A79B529615A4}"/>
+          <p:cNvPr id="9" name="Isosceles Triangle 8">
+            <a:extLst>
+              <a:ext uri="{FF2B5EF4-FFF2-40B4-BE49-F238E27FC236}">
+                <a16:creationId xmlns:a16="http://schemas.microsoft.com/office/drawing/2014/main" id="{DF520B39-F548-48A7-9A65-9929C1F0C8B8}"/>
               </a:ext>
             </a:extLst>
           </p:cNvPr>
@@ -8177,8 +7634,8 @@
           <p:nvPr/>
         </p:nvSpPr>
         <p:spPr>
-          <a:xfrm flipH="1" flipV="1">
-            <a:off x="7762873" y="-1"/>
+          <a:xfrm rot="10800000" flipH="1" flipV="1">
+            <a:off x="0" y="5724525"/>
             <a:ext cx="4429125" cy="1133475"/>
           </a:xfrm>
           <a:prstGeom prst="triangle">
@@ -8228,10 +7685,10 @@
       </p:sp>
       <p:pic>
         <p:nvPicPr>
-          <p:cNvPr id="9" name="Graphic 8" descr="Cloud">
-            <a:extLst>
-              <a:ext uri="{FF2B5EF4-FFF2-40B4-BE49-F238E27FC236}">
-                <a16:creationId xmlns:a16="http://schemas.microsoft.com/office/drawing/2014/main" id="{D425CA3D-625F-940E-10A1-D3D8A287A3B9}"/>
+          <p:cNvPr id="10" name="Graphic 9" descr="Cloud">
+            <a:extLst>
+              <a:ext uri="{FF2B5EF4-FFF2-40B4-BE49-F238E27FC236}">
+                <a16:creationId xmlns:a16="http://schemas.microsoft.com/office/drawing/2014/main" id="{5034F8E5-BB3B-571D-3247-C1C47930932C}"/>
               </a:ext>
             </a:extLst>
           </p:cNvPr>
@@ -8241,13 +7698,13 @@
           <p:nvPr/>
         </p:nvPicPr>
         <p:blipFill>
-          <a:blip r:embed="rId2">
+          <a:blip r:embed="rId3">
             <a:extLst>
               <a:ext uri="{28A0092B-C50C-407E-A947-70E740481C1C}">
                 <a14:useLocalDpi xmlns:a14="http://schemas.microsoft.com/office/drawing/2010/main" val="0"/>
               </a:ext>
               <a:ext uri="{96DAC541-7B7A-43D3-8B79-37D633B846F1}">
-                <asvg:svgBlip xmlns:asvg="http://schemas.microsoft.com/office/drawing/2016/SVG/main" r:embed="rId3"/>
+                <asvg:svgBlip xmlns:asvg="http://schemas.microsoft.com/office/drawing/2016/SVG/main" r:embed="rId4"/>
               </a:ext>
             </a:extLst>
           </a:blip>
@@ -8257,86 +7714,8 @@
         </p:blipFill>
         <p:spPr>
           <a:xfrm>
-            <a:off x="10858500" y="-225426"/>
+            <a:off x="76200" y="5724525"/>
             <a:ext cx="1333500" cy="1333500"/>
-          </a:xfrm>
-          <a:prstGeom prst="rect">
-            <a:avLst/>
-          </a:prstGeom>
-        </p:spPr>
-      </p:pic>
-      <p:pic>
-        <p:nvPicPr>
-          <p:cNvPr id="11" name="Graphic 10" descr="Briefcase">
-            <a:extLst>
-              <a:ext uri="{FF2B5EF4-FFF2-40B4-BE49-F238E27FC236}">
-                <a16:creationId xmlns:a16="http://schemas.microsoft.com/office/drawing/2014/main" id="{8534F7C1-4FBE-1F84-B88E-5FFF6F4C7DD3}"/>
-              </a:ext>
-            </a:extLst>
-          </p:cNvPr>
-          <p:cNvPicPr>
-            <a:picLocks noChangeAspect="1"/>
-          </p:cNvPicPr>
-          <p:nvPr/>
-        </p:nvPicPr>
-        <p:blipFill>
-          <a:blip r:embed="rId4">
-            <a:extLst>
-              <a:ext uri="{28A0092B-C50C-407E-A947-70E740481C1C}">
-                <a14:useLocalDpi xmlns:a14="http://schemas.microsoft.com/office/drawing/2010/main" val="0"/>
-              </a:ext>
-              <a:ext uri="{96DAC541-7B7A-43D3-8B79-37D633B846F1}">
-                <asvg:svgBlip xmlns:asvg="http://schemas.microsoft.com/office/drawing/2016/SVG/main" r:embed="rId5"/>
-              </a:ext>
-            </a:extLst>
-          </a:blip>
-          <a:stretch>
-            <a:fillRect/>
-          </a:stretch>
-        </p:blipFill>
-        <p:spPr>
-          <a:xfrm>
-            <a:off x="1829560" y="4914913"/>
-            <a:ext cx="1262278" cy="1262278"/>
-          </a:xfrm>
-          <a:prstGeom prst="rect">
-            <a:avLst/>
-          </a:prstGeom>
-        </p:spPr>
-      </p:pic>
-      <p:pic>
-        <p:nvPicPr>
-          <p:cNvPr id="15" name="Graphic 14" descr="Pilot">
-            <a:extLst>
-              <a:ext uri="{FF2B5EF4-FFF2-40B4-BE49-F238E27FC236}">
-                <a16:creationId xmlns:a16="http://schemas.microsoft.com/office/drawing/2014/main" id="{74FAA2D2-6AC5-04D8-6B14-695EBE6E4829}"/>
-              </a:ext>
-            </a:extLst>
-          </p:cNvPr>
-          <p:cNvPicPr>
-            <a:picLocks noChangeAspect="1"/>
-          </p:cNvPicPr>
-          <p:nvPr/>
-        </p:nvPicPr>
-        <p:blipFill>
-          <a:blip r:embed="rId6">
-            <a:extLst>
-              <a:ext uri="{28A0092B-C50C-407E-A947-70E740481C1C}">
-                <a14:useLocalDpi xmlns:a14="http://schemas.microsoft.com/office/drawing/2010/main" val="0"/>
-              </a:ext>
-              <a:ext uri="{96DAC541-7B7A-43D3-8B79-37D633B846F1}">
-                <asvg:svgBlip xmlns:asvg="http://schemas.microsoft.com/office/drawing/2016/SVG/main" r:embed="rId7"/>
-              </a:ext>
-            </a:extLst>
-          </a:blip>
-          <a:stretch>
-            <a:fillRect/>
-          </a:stretch>
-        </p:blipFill>
-        <p:spPr>
-          <a:xfrm>
-            <a:off x="877059" y="3018832"/>
-            <a:ext cx="1320801" cy="1320801"/>
           </a:xfrm>
           <a:prstGeom prst="rect">
             <a:avLst/>
@@ -8346,7 +7725,7 @@
     </p:spTree>
     <p:extLst>
       <p:ext uri="{BB962C8B-B14F-4D97-AF65-F5344CB8AC3E}">
-        <p14:creationId xmlns:p14="http://schemas.microsoft.com/office/powerpoint/2010/main" val="344818731"/>
+        <p14:creationId xmlns:p14="http://schemas.microsoft.com/office/powerpoint/2010/main" val="3786834488"/>
       </p:ext>
     </p:extLst>
   </p:cSld>
@@ -8378,7 +7757,7 @@
           <p:cNvPr id="2" name="Title 1">
             <a:extLst>
               <a:ext uri="{FF2B5EF4-FFF2-40B4-BE49-F238E27FC236}">
-                <a16:creationId xmlns:a16="http://schemas.microsoft.com/office/drawing/2014/main" id="{9BB362AB-B86E-A3C6-C76F-4F5530C1D43B}"/>
+                <a16:creationId xmlns:a16="http://schemas.microsoft.com/office/drawing/2014/main" id="{2DCA80F4-B316-38EA-4CCE-BF951290DAF7}"/>
               </a:ext>
             </a:extLst>
           </p:cNvPr>
@@ -8392,7 +7771,7 @@
         <p:spPr>
           <a:xfrm>
             <a:off x="838200" y="365125"/>
-            <a:ext cx="5486400" cy="1325563"/>
+            <a:ext cx="4857750" cy="1325563"/>
           </a:xfrm>
         </p:spPr>
         <p:txBody>
@@ -8401,14 +7780,7 @@
           <a:p>
             <a:r>
               <a:rPr lang="en-US" dirty="0"/>
-              <a:t>Testing Linearity </a:t>
-            </a:r>
-            <a:br>
-              <a:rPr lang="en-US" dirty="0"/>
-            </a:br>
-            <a:r>
-              <a:rPr lang="en-US" dirty="0"/>
-              <a:t>with Log Odds (1/3)</a:t>
+              <a:t>Ruling Out the Linear Model</a:t>
             </a:r>
           </a:p>
         </p:txBody>
@@ -8418,7 +7790,7 @@
           <p:cNvPr id="3" name="TextBox 2">
             <a:extLst>
               <a:ext uri="{FF2B5EF4-FFF2-40B4-BE49-F238E27FC236}">
-                <a16:creationId xmlns:a16="http://schemas.microsoft.com/office/drawing/2014/main" id="{5B469D07-E7E1-B5FF-7751-7D9F14F973C1}"/>
+                <a16:creationId xmlns:a16="http://schemas.microsoft.com/office/drawing/2014/main" id="{A74F6AA0-D4F1-DE1B-29CC-D5686C20066B}"/>
               </a:ext>
             </a:extLst>
           </p:cNvPr>
@@ -8427,8 +7799,8 @@
         </p:nvSpPr>
         <p:spPr>
           <a:xfrm>
-            <a:off x="1701800" y="1904495"/>
-            <a:ext cx="7345870" cy="1200329"/>
+            <a:off x="838200" y="1835214"/>
+            <a:ext cx="4330700" cy="4047262"/>
           </a:xfrm>
           <a:prstGeom prst="rect">
             <a:avLst/>
@@ -8441,10 +7813,12 @@
           </a:bodyPr>
           <a:lstStyle/>
           <a:p>
-            <a:pPr>
+            <a:pPr marL="285750" indent="-285750">
               <a:spcAft>
                 <a:spcPts val="600"/>
               </a:spcAft>
+              <a:buFont typeface="Arial" panose="020B0604020202020204" pitchFamily="34" charset="0"/>
+              <a:buChar char="•"/>
             </a:pPr>
             <a:r>
               <a:rPr lang="en-US" dirty="0">
@@ -8452,7 +7826,7 @@
                   <a:srgbClr val="333333"/>
                 </a:solidFill>
               </a:rPr>
-              <a:t>Unlike a standard linear regression, which assumes that independent parameters have a linear relationship with the dependent variable, </a:t>
+              <a:t>Before engaging in further analysis, we first identified that </a:t>
             </a:r>
             <a:r>
               <a:rPr lang="en-US" b="1" dirty="0">
@@ -8460,135 +7834,59 @@
                   <a:srgbClr val="333333"/>
                 </a:solidFill>
               </a:rPr>
-              <a:t>logistic regression assumes that parameters have a linear relationship with the log odds.</a:t>
-            </a:r>
-          </a:p>
-        </p:txBody>
-      </p:sp>
-      <p:sp>
-        <p:nvSpPr>
-          <p:cNvPr id="5" name="TextBox 4">
-            <a:extLst>
-              <a:ext uri="{FF2B5EF4-FFF2-40B4-BE49-F238E27FC236}">
-                <a16:creationId xmlns:a16="http://schemas.microsoft.com/office/drawing/2014/main" id="{24A99E9D-02CF-C8B9-06FB-12253987B204}"/>
-              </a:ext>
-            </a:extLst>
-          </p:cNvPr>
-          <p:cNvSpPr txBox="1"/>
-          <p:nvPr/>
-        </p:nvSpPr>
-        <p:spPr>
-          <a:xfrm>
-            <a:off x="2618500" y="3353272"/>
-            <a:ext cx="7392070" cy="1200329"/>
-          </a:xfrm>
-          <a:prstGeom prst="rect">
-            <a:avLst/>
-          </a:prstGeom>
-          <a:noFill/>
-        </p:spPr>
-        <p:txBody>
-          <a:bodyPr wrap="square">
-            <a:spAutoFit/>
-          </a:bodyPr>
-          <a:lstStyle/>
-          <a:p>
-            <a:pPr>
+              <a:t>satisfaction</a:t>
+            </a:r>
+            <a:r>
+              <a:rPr lang="en-US" dirty="0">
+                <a:solidFill>
+                  <a:srgbClr val="333333"/>
+                </a:solidFill>
+              </a:rPr>
+              <a:t>—as a categorical/binary variable—</a:t>
+            </a:r>
+            <a:r>
+              <a:rPr lang="en-US" b="1" dirty="0">
+                <a:solidFill>
+                  <a:srgbClr val="333333"/>
+                </a:solidFill>
+              </a:rPr>
+              <a:t>cannot be reliably predicted through a linear model</a:t>
+            </a:r>
+            <a:r>
+              <a:rPr lang="en-US" dirty="0">
+                <a:solidFill>
+                  <a:srgbClr val="333333"/>
+                </a:solidFill>
+              </a:rPr>
+              <a:t>. We created a rough initial model to demonstrate this roadblock.</a:t>
+            </a:r>
+          </a:p>
+          <a:p>
+            <a:pPr marL="285750" indent="-285750">
               <a:spcAft>
                 <a:spcPts val="600"/>
               </a:spcAft>
+              <a:buFont typeface="Arial" panose="020B0604020202020204" pitchFamily="34" charset="0"/>
+              <a:buChar char="•"/>
             </a:pPr>
             <a:r>
-              <a:rPr lang="en-US" dirty="0">
-                <a:solidFill>
-                  <a:srgbClr val="333333"/>
-                </a:solidFill>
-              </a:rPr>
-              <a:t>Odds represent the number of favorable outcomes divided by the number of unfavorable outcomes. Put differently, if “p” represents the probability of favorable outcomes, </a:t>
-            </a:r>
-            <a:r>
-              <a:rPr lang="en-US" b="1" dirty="0">
-                <a:solidFill>
-                  <a:srgbClr val="333333"/>
-                </a:solidFill>
-              </a:rPr>
-              <a:t>Odds = p/(1-p). Log odds take the natural log of the odds, which can be expressed as ln(p/1-p)).</a:t>
-            </a:r>
-          </a:p>
-        </p:txBody>
-      </p:sp>
-      <p:sp>
-        <p:nvSpPr>
-          <p:cNvPr id="7" name="TextBox 6">
-            <a:extLst>
-              <a:ext uri="{FF2B5EF4-FFF2-40B4-BE49-F238E27FC236}">
-                <a16:creationId xmlns:a16="http://schemas.microsoft.com/office/drawing/2014/main" id="{07868C0A-A8AD-AC37-B0C8-338A4ED6BC96}"/>
-              </a:ext>
-            </a:extLst>
-          </p:cNvPr>
-          <p:cNvSpPr txBox="1"/>
-          <p:nvPr/>
-        </p:nvSpPr>
-        <p:spPr>
-          <a:xfrm>
-            <a:off x="3581400" y="4802049"/>
-            <a:ext cx="7877175" cy="1477328"/>
-          </a:xfrm>
-          <a:prstGeom prst="rect">
-            <a:avLst/>
-          </a:prstGeom>
-          <a:noFill/>
-        </p:spPr>
-        <p:txBody>
-          <a:bodyPr wrap="square">
-            <a:spAutoFit/>
-          </a:bodyPr>
-          <a:lstStyle/>
-          <a:p>
-            <a:pPr>
-              <a:spcAft>
-                <a:spcPts val="600"/>
-              </a:spcAft>
-            </a:pPr>
-            <a:r>
-              <a:rPr lang="en-US" dirty="0">
-                <a:solidFill>
-                  <a:srgbClr val="333333"/>
-                </a:solidFill>
-              </a:rPr>
-              <a:t>We can use a visual test to examine whether or not this assumption holds true for continuous variables. While it is not sensible to compute log odds for individual data points, </a:t>
-            </a:r>
-            <a:r>
-              <a:rPr lang="en-US" b="1" dirty="0">
-                <a:solidFill>
-                  <a:srgbClr val="333333"/>
-                </a:solidFill>
-              </a:rPr>
-              <a:t>we can group continuous variables into discrete buckets—calculating the average log odds for each</a:t>
-            </a:r>
-            <a:r>
-              <a:rPr lang="en-US" dirty="0">
-                <a:solidFill>
-                  <a:srgbClr val="333333"/>
-                </a:solidFill>
-              </a:rPr>
-              <a:t>—to examine whether or not they might satisfy this assumption.</a:t>
-            </a:r>
-            <a:endParaRPr lang="en-US" dirty="0"/>
+              <a:rPr lang="en-US" dirty="0"/>
+              <a:t>We can see that, despite purportedly containing various coefficients of high statistical significance, the linear model is fundamentally incapable of modeling binary output. For various x-values, the linear model predicts unattainable values between satisfied or neutral/dissatisfied (encoded as 1 and 0 respectively).</a:t>
+            </a:r>
           </a:p>
         </p:txBody>
       </p:sp>
       <p:pic>
         <p:nvPicPr>
-          <p:cNvPr id="12" name="Graphic 11" descr="Mountain scene">
-            <a:extLst>
-              <a:ext uri="{FF2B5EF4-FFF2-40B4-BE49-F238E27FC236}">
-                <a16:creationId xmlns:a16="http://schemas.microsoft.com/office/drawing/2014/main" id="{7035C8CA-E5E4-1F8B-958D-529DB980C2C6}"/>
+          <p:cNvPr id="13314" name="Picture 2">
+            <a:extLst>
+              <a:ext uri="{FF2B5EF4-FFF2-40B4-BE49-F238E27FC236}">
+                <a16:creationId xmlns:a16="http://schemas.microsoft.com/office/drawing/2014/main" id="{48BF37C5-CEF4-4B33-3A06-B8BE48DBAA18}"/>
               </a:ext>
             </a:extLst>
           </p:cNvPr>
           <p:cNvPicPr>
-            <a:picLocks noChangeAspect="1"/>
+            <a:picLocks noChangeAspect="1" noChangeArrowheads="1"/>
           </p:cNvPicPr>
           <p:nvPr/>
         </p:nvPicPr>
@@ -8598,109 +7896,505 @@
               <a:ext uri="{28A0092B-C50C-407E-A947-70E740481C1C}">
                 <a14:useLocalDpi xmlns:a14="http://schemas.microsoft.com/office/drawing/2010/main" val="0"/>
               </a:ext>
-              <a:ext uri="{96DAC541-7B7A-43D3-8B79-37D633B846F1}">
-                <asvg:svgBlip xmlns:asvg="http://schemas.microsoft.com/office/drawing/2016/SVG/main" r:embed="rId3"/>
-              </a:ext>
             </a:extLst>
           </a:blip>
+          <a:srcRect/>
           <a:stretch>
             <a:fillRect/>
           </a:stretch>
         </p:blipFill>
-        <p:spPr>
+        <p:spPr bwMode="auto">
           <a:xfrm>
-            <a:off x="1704100" y="3496236"/>
-            <a:ext cx="914400" cy="914400"/>
+            <a:off x="5419725" y="143328"/>
+            <a:ext cx="6571344" cy="6571344"/>
           </a:xfrm>
           <a:prstGeom prst="rect">
             <a:avLst/>
           </a:prstGeom>
+          <a:noFill/>
+          <a:extLst>
+            <a:ext uri="{909E8E84-426E-40DD-AFC4-6F175D3DCCD1}">
+              <a14:hiddenFill xmlns:a14="http://schemas.microsoft.com/office/drawing/2010/main">
+                <a:solidFill>
+                  <a:srgbClr val="FFFFFF"/>
+                </a:solidFill>
+              </a14:hiddenFill>
+            </a:ext>
+          </a:extLst>
         </p:spPr>
       </p:pic>
-      <p:pic>
-        <p:nvPicPr>
-          <p:cNvPr id="14" name="Graphic 13" descr="Tropical scene">
-            <a:extLst>
-              <a:ext uri="{FF2B5EF4-FFF2-40B4-BE49-F238E27FC236}">
-                <a16:creationId xmlns:a16="http://schemas.microsoft.com/office/drawing/2014/main" id="{0CEC0B41-A241-066D-8FE5-DFC86C1A59AD}"/>
-              </a:ext>
-            </a:extLst>
-          </p:cNvPr>
-          <p:cNvPicPr>
-            <a:picLocks noChangeAspect="1"/>
-          </p:cNvPicPr>
+      <p:sp>
+        <p:nvSpPr>
+          <p:cNvPr id="4" name="Rectangle 3">
+            <a:extLst>
+              <a:ext uri="{FF2B5EF4-FFF2-40B4-BE49-F238E27FC236}">
+                <a16:creationId xmlns:a16="http://schemas.microsoft.com/office/drawing/2014/main" id="{DB4523F8-9A24-9895-AF51-C0538884D0B1}"/>
+              </a:ext>
+            </a:extLst>
+          </p:cNvPr>
+          <p:cNvSpPr>
+            <a:spLocks noChangeArrowheads="1"/>
+          </p:cNvSpPr>
           <p:nvPr/>
-        </p:nvPicPr>
-        <p:blipFill>
-          <a:blip r:embed="rId4">
-            <a:extLst>
-              <a:ext uri="{28A0092B-C50C-407E-A947-70E740481C1C}">
-                <a14:useLocalDpi xmlns:a14="http://schemas.microsoft.com/office/drawing/2010/main" val="0"/>
-              </a:ext>
-              <a:ext uri="{96DAC541-7B7A-43D3-8B79-37D633B846F1}">
-                <asvg:svgBlip xmlns:asvg="http://schemas.microsoft.com/office/drawing/2016/SVG/main" r:embed="rId5"/>
-              </a:ext>
-            </a:extLst>
-          </a:blip>
-          <a:stretch>
-            <a:fillRect/>
-          </a:stretch>
-        </p:blipFill>
-        <p:spPr>
+        </p:nvSpPr>
+        <p:spPr bwMode="auto">
           <a:xfrm>
-            <a:off x="787400" y="2053154"/>
-            <a:ext cx="914400" cy="914400"/>
+            <a:off x="6261102" y="1166405"/>
+            <a:ext cx="3350276" cy="1787649"/>
           </a:xfrm>
           <a:prstGeom prst="rect">
             <a:avLst/>
           </a:prstGeom>
-        </p:spPr>
-      </p:pic>
-      <p:pic>
-        <p:nvPicPr>
-          <p:cNvPr id="16" name="Graphic 15" descr="City">
-            <a:extLst>
-              <a:ext uri="{FF2B5EF4-FFF2-40B4-BE49-F238E27FC236}">
-                <a16:creationId xmlns:a16="http://schemas.microsoft.com/office/drawing/2014/main" id="{8D25AA89-71E7-FDE7-AEC5-942635CD3666}"/>
-              </a:ext>
-            </a:extLst>
-          </p:cNvPr>
-          <p:cNvPicPr>
-            <a:picLocks noChangeAspect="1"/>
-          </p:cNvPicPr>
-          <p:nvPr/>
-        </p:nvPicPr>
-        <p:blipFill>
-          <a:blip r:embed="rId6">
-            <a:extLst>
-              <a:ext uri="{28A0092B-C50C-407E-A947-70E740481C1C}">
-                <a14:useLocalDpi xmlns:a14="http://schemas.microsoft.com/office/drawing/2010/main" val="0"/>
-              </a:ext>
-              <a:ext uri="{96DAC541-7B7A-43D3-8B79-37D633B846F1}">
-                <asvg:svgBlip xmlns:asvg="http://schemas.microsoft.com/office/drawing/2016/SVG/main" r:embed="rId7"/>
-              </a:ext>
-            </a:extLst>
-          </a:blip>
-          <a:stretch>
-            <a:fillRect/>
-          </a:stretch>
-        </p:blipFill>
-        <p:spPr>
-          <a:xfrm>
-            <a:off x="2667000" y="5083513"/>
-            <a:ext cx="914400" cy="914400"/>
-          </a:xfrm>
-          <a:prstGeom prst="rect">
-            <a:avLst/>
-          </a:prstGeom>
-        </p:spPr>
-      </p:pic>
+          <a:solidFill>
+            <a:srgbClr val="FFFFFF"/>
+          </a:solidFill>
+          <a:ln>
+            <a:noFill/>
+          </a:ln>
+          <a:effectLst/>
+          <a:extLst>
+            <a:ext uri="{91240B29-F687-4F45-9708-019B960494DF}">
+              <a14:hiddenLine xmlns:a14="http://schemas.microsoft.com/office/drawing/2010/main" w="9525">
+                <a:solidFill>
+                  <a:schemeClr val="tx1"/>
+                </a:solidFill>
+                <a:miter lim="800000"/>
+                <a:headEnd/>
+                <a:tailEnd/>
+              </a14:hiddenLine>
+            </a:ext>
+            <a:ext uri="{AF507438-7753-43E0-B8FC-AC1667EBCBE1}">
+              <a14:hiddenEffects xmlns:a14="http://schemas.microsoft.com/office/drawing/2010/main">
+                <a:effectLst>
+                  <a:outerShdw dist="35921" dir="2700000" algn="ctr" rotWithShape="0">
+                    <a:schemeClr val="bg2"/>
+                  </a:outerShdw>
+                </a:effectLst>
+              </a14:hiddenEffects>
+            </a:ext>
+          </a:extLst>
+        </p:spPr>
+        <p:txBody>
+          <a:bodyPr vert="horz" wrap="none" lIns="0" tIns="0" rIns="0" bIns="63480" numCol="1" anchor="ctr" anchorCtr="0" compatLnSpc="1">
+            <a:prstTxWarp prst="textNoShape">
+              <a:avLst/>
+            </a:prstTxWarp>
+            <a:spAutoFit/>
+          </a:bodyPr>
+          <a:lstStyle/>
+          <a:p>
+            <a:pPr marL="0" marR="0" lvl="0" indent="0" algn="l" defTabSz="914400" rtl="0" eaLnBrk="0" fontAlgn="base" latinLnBrk="0" hangingPunct="0">
+              <a:lnSpc>
+                <a:spcPct val="100000"/>
+              </a:lnSpc>
+              <a:spcBef>
+                <a:spcPct val="0"/>
+              </a:spcBef>
+              <a:spcAft>
+                <a:spcPts val="600"/>
+              </a:spcAft>
+              <a:buClrTx/>
+              <a:buSzTx/>
+              <a:buFontTx/>
+              <a:buNone/>
+              <a:tabLst/>
+            </a:pPr>
+            <a:r>
+              <a:rPr kumimoji="0" lang="en-US" altLang="en-US" sz="800" b="0" i="0" u="none" strike="noStrike" cap="none" normalizeH="0" baseline="0" dirty="0">
+                <a:ln>
+                  <a:noFill/>
+                </a:ln>
+                <a:solidFill>
+                  <a:srgbClr val="333333"/>
+                </a:solidFill>
+                <a:effectLst/>
+                <a:latin typeface="Courier New" panose="02070309020205020404" pitchFamily="49" charset="0"/>
+              </a:rPr>
+              <a:t>Coefficients: </a:t>
+            </a:r>
+          </a:p>
+          <a:p>
+            <a:pPr marL="0" marR="0" lvl="0" indent="0" algn="l" defTabSz="914400" rtl="0" eaLnBrk="0" fontAlgn="base" latinLnBrk="0" hangingPunct="0">
+              <a:lnSpc>
+                <a:spcPct val="100000"/>
+              </a:lnSpc>
+              <a:spcBef>
+                <a:spcPct val="0"/>
+              </a:spcBef>
+              <a:spcAft>
+                <a:spcPts val="600"/>
+              </a:spcAft>
+              <a:buClrTx/>
+              <a:buSzTx/>
+              <a:buFontTx/>
+              <a:buNone/>
+              <a:tabLst/>
+            </a:pPr>
+            <a:r>
+              <a:rPr kumimoji="0" lang="en-US" altLang="en-US" sz="800" b="0" i="0" u="none" strike="noStrike" cap="none" normalizeH="0" baseline="0" dirty="0">
+                <a:ln>
+                  <a:noFill/>
+                </a:ln>
+                <a:solidFill>
+                  <a:srgbClr val="333333"/>
+                </a:solidFill>
+                <a:effectLst/>
+                <a:latin typeface="Courier New" panose="02070309020205020404" pitchFamily="49" charset="0"/>
+              </a:rPr>
+              <a:t>## Estimate Std. Error t value </a:t>
+            </a:r>
+            <a:r>
+              <a:rPr kumimoji="0" lang="en-US" altLang="en-US" sz="800" b="0" i="0" u="none" strike="noStrike" cap="none" normalizeH="0" baseline="0" dirty="0" err="1">
+                <a:ln>
+                  <a:noFill/>
+                </a:ln>
+                <a:solidFill>
+                  <a:srgbClr val="333333"/>
+                </a:solidFill>
+                <a:effectLst/>
+                <a:latin typeface="Courier New" panose="02070309020205020404" pitchFamily="49" charset="0"/>
+              </a:rPr>
+              <a:t>Pr</a:t>
+            </a:r>
+            <a:r>
+              <a:rPr kumimoji="0" lang="en-US" altLang="en-US" sz="800" b="0" i="0" u="none" strike="noStrike" cap="none" normalizeH="0" baseline="0" dirty="0">
+                <a:ln>
+                  <a:noFill/>
+                </a:ln>
+                <a:solidFill>
+                  <a:srgbClr val="333333"/>
+                </a:solidFill>
+                <a:effectLst/>
+                <a:latin typeface="Courier New" panose="02070309020205020404" pitchFamily="49" charset="0"/>
+              </a:rPr>
+              <a:t>(&gt;|t|) </a:t>
+            </a:r>
+          </a:p>
+          <a:p>
+            <a:pPr marL="0" marR="0" lvl="0" indent="0" algn="l" defTabSz="914400" rtl="0" eaLnBrk="0" fontAlgn="base" latinLnBrk="0" hangingPunct="0">
+              <a:lnSpc>
+                <a:spcPct val="100000"/>
+              </a:lnSpc>
+              <a:spcBef>
+                <a:spcPct val="0"/>
+              </a:spcBef>
+              <a:spcAft>
+                <a:spcPts val="600"/>
+              </a:spcAft>
+              <a:buClrTx/>
+              <a:buSzTx/>
+              <a:buFontTx/>
+              <a:buNone/>
+              <a:tabLst/>
+            </a:pPr>
+            <a:r>
+              <a:rPr kumimoji="0" lang="en-US" altLang="en-US" sz="800" b="0" i="0" u="none" strike="noStrike" cap="none" normalizeH="0" baseline="0" dirty="0">
+                <a:ln>
+                  <a:noFill/>
+                </a:ln>
+                <a:solidFill>
+                  <a:srgbClr val="333333"/>
+                </a:solidFill>
+                <a:effectLst/>
+                <a:latin typeface="Courier New" panose="02070309020205020404" pitchFamily="49" charset="0"/>
+              </a:rPr>
+              <a:t>## (Intercept) -3.69e-01 5.04e-03 -73.15 &lt; 2e-16 *** </a:t>
+            </a:r>
+          </a:p>
+          <a:p>
+            <a:pPr marL="0" marR="0" lvl="0" indent="0" algn="l" defTabSz="914400" rtl="0" eaLnBrk="0" fontAlgn="base" latinLnBrk="0" hangingPunct="0">
+              <a:lnSpc>
+                <a:spcPct val="100000"/>
+              </a:lnSpc>
+              <a:spcBef>
+                <a:spcPct val="0"/>
+              </a:spcBef>
+              <a:spcAft>
+                <a:spcPts val="600"/>
+              </a:spcAft>
+              <a:buClrTx/>
+              <a:buSzTx/>
+              <a:buFontTx/>
+              <a:buNone/>
+              <a:tabLst/>
+            </a:pPr>
+            <a:r>
+              <a:rPr kumimoji="0" lang="en-US" altLang="en-US" sz="800" b="0" i="0" u="none" strike="noStrike" cap="none" normalizeH="0" baseline="0" dirty="0">
+                <a:ln>
+                  <a:noFill/>
+                </a:ln>
+                <a:solidFill>
+                  <a:srgbClr val="333333"/>
+                </a:solidFill>
+                <a:effectLst/>
+                <a:latin typeface="Courier New" panose="02070309020205020404" pitchFamily="49" charset="0"/>
+              </a:rPr>
+              <a:t>## Gender 2.92e-03 2.51e-03 1.17 0.24 </a:t>
+            </a:r>
+          </a:p>
+          <a:p>
+            <a:pPr marL="0" marR="0" lvl="0" indent="0" algn="l" defTabSz="914400" rtl="0" eaLnBrk="0" fontAlgn="base" latinLnBrk="0" hangingPunct="0">
+              <a:lnSpc>
+                <a:spcPct val="100000"/>
+              </a:lnSpc>
+              <a:spcBef>
+                <a:spcPct val="0"/>
+              </a:spcBef>
+              <a:spcAft>
+                <a:spcPts val="600"/>
+              </a:spcAft>
+              <a:buClrTx/>
+              <a:buSzTx/>
+              <a:buFontTx/>
+              <a:buNone/>
+              <a:tabLst/>
+            </a:pPr>
+            <a:r>
+              <a:rPr kumimoji="0" lang="en-US" altLang="en-US" sz="800" b="0" i="0" u="none" strike="noStrike" cap="none" normalizeH="0" baseline="0" dirty="0">
+                <a:ln>
+                  <a:noFill/>
+                </a:ln>
+                <a:solidFill>
+                  <a:srgbClr val="333333"/>
+                </a:solidFill>
+                <a:effectLst/>
+                <a:latin typeface="Courier New" panose="02070309020205020404" pitchFamily="49" charset="0"/>
+              </a:rPr>
+              <a:t>## </a:t>
+            </a:r>
+            <a:r>
+              <a:rPr kumimoji="0" lang="en-US" altLang="en-US" sz="800" b="0" i="0" u="none" strike="noStrike" cap="none" normalizeH="0" baseline="0" dirty="0" err="1">
+                <a:ln>
+                  <a:noFill/>
+                </a:ln>
+                <a:solidFill>
+                  <a:srgbClr val="333333"/>
+                </a:solidFill>
+                <a:effectLst/>
+                <a:latin typeface="Courier New" panose="02070309020205020404" pitchFamily="49" charset="0"/>
+              </a:rPr>
+              <a:t>Customer.Type</a:t>
+            </a:r>
+            <a:r>
+              <a:rPr kumimoji="0" lang="en-US" altLang="en-US" sz="800" b="0" i="0" u="none" strike="noStrike" cap="none" normalizeH="0" baseline="0" dirty="0">
+                <a:ln>
+                  <a:noFill/>
+                </a:ln>
+                <a:solidFill>
+                  <a:srgbClr val="333333"/>
+                </a:solidFill>
+                <a:effectLst/>
+                <a:latin typeface="Courier New" panose="02070309020205020404" pitchFamily="49" charset="0"/>
+              </a:rPr>
+              <a:t> 4.10e-01 3.96e-03 103.42 &lt; 2e-16 *** </a:t>
+            </a:r>
+          </a:p>
+          <a:p>
+            <a:pPr marL="0" marR="0" lvl="0" indent="0" algn="l" defTabSz="914400" rtl="0" eaLnBrk="0" fontAlgn="base" latinLnBrk="0" hangingPunct="0">
+              <a:lnSpc>
+                <a:spcPct val="100000"/>
+              </a:lnSpc>
+              <a:spcBef>
+                <a:spcPct val="0"/>
+              </a:spcBef>
+              <a:spcAft>
+                <a:spcPts val="600"/>
+              </a:spcAft>
+              <a:buClrTx/>
+              <a:buSzTx/>
+              <a:buFontTx/>
+              <a:buNone/>
+              <a:tabLst/>
+            </a:pPr>
+            <a:r>
+              <a:rPr kumimoji="0" lang="en-US" altLang="en-US" sz="800" b="0" i="0" u="none" strike="noStrike" cap="none" normalizeH="0" baseline="0" dirty="0">
+                <a:ln>
+                  <a:noFill/>
+                </a:ln>
+                <a:solidFill>
+                  <a:srgbClr val="333333"/>
+                </a:solidFill>
+                <a:effectLst/>
+                <a:latin typeface="Courier New" panose="02070309020205020404" pitchFamily="49" charset="0"/>
+              </a:rPr>
+              <a:t>## Age 5.34e-04 8.72e-05 6.12 9.4e-10 *** </a:t>
+            </a:r>
+          </a:p>
+          <a:p>
+            <a:pPr marL="0" marR="0" lvl="0" indent="0" algn="l" defTabSz="914400" rtl="0" eaLnBrk="0" fontAlgn="base" latinLnBrk="0" hangingPunct="0">
+              <a:lnSpc>
+                <a:spcPct val="100000"/>
+              </a:lnSpc>
+              <a:spcBef>
+                <a:spcPct val="0"/>
+              </a:spcBef>
+              <a:spcAft>
+                <a:spcPts val="600"/>
+              </a:spcAft>
+              <a:buClrTx/>
+              <a:buSzTx/>
+              <a:buFontTx/>
+              <a:buNone/>
+              <a:tabLst/>
+            </a:pPr>
+            <a:r>
+              <a:rPr kumimoji="0" lang="en-US" altLang="en-US" sz="800" b="0" i="0" u="none" strike="noStrike" cap="none" normalizeH="0" baseline="0" dirty="0">
+                <a:ln>
+                  <a:noFill/>
+                </a:ln>
+                <a:solidFill>
+                  <a:srgbClr val="333333"/>
+                </a:solidFill>
+                <a:effectLst/>
+                <a:latin typeface="Courier New" panose="02070309020205020404" pitchFamily="49" charset="0"/>
+              </a:rPr>
+              <a:t>## </a:t>
+            </a:r>
+            <a:r>
+              <a:rPr kumimoji="0" lang="en-US" altLang="en-US" sz="800" b="0" i="0" u="none" strike="noStrike" cap="none" normalizeH="0" baseline="0" dirty="0" err="1">
+                <a:ln>
+                  <a:noFill/>
+                </a:ln>
+                <a:solidFill>
+                  <a:srgbClr val="333333"/>
+                </a:solidFill>
+                <a:effectLst/>
+                <a:latin typeface="Courier New" panose="02070309020205020404" pitchFamily="49" charset="0"/>
+              </a:rPr>
+              <a:t>Type.of.Travel</a:t>
+            </a:r>
+            <a:r>
+              <a:rPr kumimoji="0" lang="en-US" altLang="en-US" sz="800" b="0" i="0" u="none" strike="noStrike" cap="none" normalizeH="0" baseline="0" dirty="0">
+                <a:ln>
+                  <a:noFill/>
+                </a:ln>
+                <a:solidFill>
+                  <a:srgbClr val="333333"/>
+                </a:solidFill>
+                <a:effectLst/>
+                <a:latin typeface="Courier New" panose="02070309020205020404" pitchFamily="49" charset="0"/>
+              </a:rPr>
+              <a:t> 4.34e-01 3.61e-03 120.27 &lt; 2e-16 *** </a:t>
+            </a:r>
+          </a:p>
+          <a:p>
+            <a:pPr marL="0" marR="0" lvl="0" indent="0" algn="l" defTabSz="914400" rtl="0" eaLnBrk="0" fontAlgn="base" latinLnBrk="0" hangingPunct="0">
+              <a:lnSpc>
+                <a:spcPct val="100000"/>
+              </a:lnSpc>
+              <a:spcBef>
+                <a:spcPct val="0"/>
+              </a:spcBef>
+              <a:spcAft>
+                <a:spcPts val="600"/>
+              </a:spcAft>
+              <a:buClrTx/>
+              <a:buSzTx/>
+              <a:buFontTx/>
+              <a:buNone/>
+              <a:tabLst/>
+            </a:pPr>
+            <a:r>
+              <a:rPr kumimoji="0" lang="en-US" altLang="en-US" sz="800" b="0" i="0" u="none" strike="noStrike" cap="none" normalizeH="0" baseline="0" dirty="0">
+                <a:ln>
+                  <a:noFill/>
+                </a:ln>
+                <a:solidFill>
+                  <a:srgbClr val="333333"/>
+                </a:solidFill>
+                <a:effectLst/>
+                <a:latin typeface="Courier New" panose="02070309020205020404" pitchFamily="49" charset="0"/>
+              </a:rPr>
+              <a:t>## Class 2.42e-01 3.38e-03 71.81 &lt; 2e-16 *** </a:t>
+            </a:r>
+          </a:p>
+          <a:p>
+            <a:pPr marL="0" marR="0" lvl="0" indent="0" algn="l" defTabSz="914400" rtl="0" eaLnBrk="0" fontAlgn="base" latinLnBrk="0" hangingPunct="0">
+              <a:lnSpc>
+                <a:spcPct val="100000"/>
+              </a:lnSpc>
+              <a:spcBef>
+                <a:spcPct val="0"/>
+              </a:spcBef>
+              <a:spcAft>
+                <a:spcPts val="600"/>
+              </a:spcAft>
+              <a:buClrTx/>
+              <a:buSzTx/>
+              <a:buFontTx/>
+              <a:buNone/>
+              <a:tabLst/>
+            </a:pPr>
+            <a:r>
+              <a:rPr kumimoji="0" lang="en-US" altLang="en-US" sz="800" b="0" i="0" u="none" strike="noStrike" cap="none" normalizeH="0" baseline="0" dirty="0">
+                <a:ln>
+                  <a:noFill/>
+                </a:ln>
+                <a:solidFill>
+                  <a:srgbClr val="333333"/>
+                </a:solidFill>
+                <a:effectLst/>
+                <a:latin typeface="Courier New" panose="02070309020205020404" pitchFamily="49" charset="0"/>
+              </a:rPr>
+              <a:t>## </a:t>
+            </a:r>
+            <a:r>
+              <a:rPr kumimoji="0" lang="en-US" altLang="en-US" sz="800" b="0" i="0" u="none" strike="noStrike" cap="none" normalizeH="0" baseline="0" dirty="0" err="1">
+                <a:ln>
+                  <a:noFill/>
+                </a:ln>
+                <a:solidFill>
+                  <a:srgbClr val="333333"/>
+                </a:solidFill>
+                <a:effectLst/>
+                <a:latin typeface="Courier New" panose="02070309020205020404" pitchFamily="49" charset="0"/>
+              </a:rPr>
+              <a:t>Flight.Distance</a:t>
+            </a:r>
+            <a:r>
+              <a:rPr kumimoji="0" lang="en-US" altLang="en-US" sz="800" b="0" i="0" u="none" strike="noStrike" cap="none" normalizeH="0" baseline="0" dirty="0">
+                <a:ln>
+                  <a:noFill/>
+                </a:ln>
+                <a:solidFill>
+                  <a:srgbClr val="333333"/>
+                </a:solidFill>
+                <a:effectLst/>
+                <a:latin typeface="Courier New" panose="02070309020205020404" pitchFamily="49" charset="0"/>
+              </a:rPr>
+              <a:t> 8.38e-06 1.45e-06 5.77 8.1e-09 ***</a:t>
+            </a:r>
+            <a:r>
+              <a:rPr kumimoji="0" lang="en-US" altLang="en-US" sz="800" b="0" i="0" u="none" strike="noStrike" cap="none" normalizeH="0" baseline="0" dirty="0">
+                <a:ln>
+                  <a:noFill/>
+                </a:ln>
+                <a:solidFill>
+                  <a:schemeClr val="tx1"/>
+                </a:solidFill>
+                <a:effectLst/>
+              </a:rPr>
+              <a:t> </a:t>
+            </a:r>
+            <a:endParaRPr kumimoji="0" lang="en-US" altLang="en-US" sz="800" b="0" i="0" u="none" strike="noStrike" cap="none" normalizeH="0" baseline="0" dirty="0">
+              <a:ln>
+                <a:noFill/>
+              </a:ln>
+              <a:solidFill>
+                <a:schemeClr val="tx1"/>
+              </a:solidFill>
+              <a:effectLst/>
+              <a:latin typeface="Arial" panose="020B0604020202020204" pitchFamily="34" charset="0"/>
+            </a:endParaRPr>
+          </a:p>
+        </p:txBody>
+      </p:sp>
       <p:sp>
         <p:nvSpPr>
-          <p:cNvPr id="17" name="Isosceles Triangle 16">
-            <a:extLst>
-              <a:ext uri="{FF2B5EF4-FFF2-40B4-BE49-F238E27FC236}">
-                <a16:creationId xmlns:a16="http://schemas.microsoft.com/office/drawing/2014/main" id="{B7E51072-487B-7841-86FC-29E0CB8278A4}"/>
+          <p:cNvPr id="5" name="Isosceles Triangle 4">
+            <a:extLst>
+              <a:ext uri="{FF2B5EF4-FFF2-40B4-BE49-F238E27FC236}">
+                <a16:creationId xmlns:a16="http://schemas.microsoft.com/office/drawing/2014/main" id="{AEAE6FC0-75E8-6CE0-E76B-8E1477D4CC6A}"/>
               </a:ext>
             </a:extLst>
           </p:cNvPr>
@@ -8708,8 +8402,8 @@
           <p:nvPr/>
         </p:nvSpPr>
         <p:spPr>
-          <a:xfrm flipH="1" flipV="1">
-            <a:off x="7762873" y="-1"/>
+          <a:xfrm rot="10800000" flipH="1" flipV="1">
+            <a:off x="0" y="5724525"/>
             <a:ext cx="4429125" cy="1133475"/>
           </a:xfrm>
           <a:prstGeom prst="triangle">
@@ -8759,10 +8453,10 @@
       </p:sp>
       <p:pic>
         <p:nvPicPr>
-          <p:cNvPr id="18" name="Graphic 17" descr="Cloud">
-            <a:extLst>
-              <a:ext uri="{FF2B5EF4-FFF2-40B4-BE49-F238E27FC236}">
-                <a16:creationId xmlns:a16="http://schemas.microsoft.com/office/drawing/2014/main" id="{D4ABD1C4-AE72-9CE0-0DA8-0E7B47F4FACB}"/>
+          <p:cNvPr id="6" name="Graphic 5" descr="Cloud">
+            <a:extLst>
+              <a:ext uri="{FF2B5EF4-FFF2-40B4-BE49-F238E27FC236}">
+                <a16:creationId xmlns:a16="http://schemas.microsoft.com/office/drawing/2014/main" id="{BEDF8DD6-1808-AB72-D919-10F43439180E}"/>
               </a:ext>
             </a:extLst>
           </p:cNvPr>
@@ -8772,13 +8466,13 @@
           <p:nvPr/>
         </p:nvPicPr>
         <p:blipFill>
-          <a:blip r:embed="rId8">
+          <a:blip r:embed="rId3">
             <a:extLst>
               <a:ext uri="{28A0092B-C50C-407E-A947-70E740481C1C}">
                 <a14:useLocalDpi xmlns:a14="http://schemas.microsoft.com/office/drawing/2010/main" val="0"/>
               </a:ext>
               <a:ext uri="{96DAC541-7B7A-43D3-8B79-37D633B846F1}">
-                <asvg:svgBlip xmlns:asvg="http://schemas.microsoft.com/office/drawing/2016/SVG/main" r:embed="rId9"/>
+                <asvg:svgBlip xmlns:asvg="http://schemas.microsoft.com/office/drawing/2016/SVG/main" r:embed="rId4"/>
               </a:ext>
             </a:extLst>
           </a:blip>
@@ -8788,7 +8482,7 @@
         </p:blipFill>
         <p:spPr>
           <a:xfrm>
-            <a:off x="10858500" y="-225426"/>
+            <a:off x="76200" y="5724525"/>
             <a:ext cx="1333500" cy="1333500"/>
           </a:xfrm>
           <a:prstGeom prst="rect">
@@ -8799,7 +8493,7 @@
     </p:spTree>
     <p:extLst>
       <p:ext uri="{BB962C8B-B14F-4D97-AF65-F5344CB8AC3E}">
-        <p14:creationId xmlns:p14="http://schemas.microsoft.com/office/powerpoint/2010/main" val="1573223430"/>
+        <p14:creationId xmlns:p14="http://schemas.microsoft.com/office/powerpoint/2010/main" val="2613039472"/>
       </p:ext>
     </p:extLst>
   </p:cSld>
@@ -9460,10 +9154,252 @@
       </p:grpSpPr>
       <p:sp>
         <p:nvSpPr>
-          <p:cNvPr id="6" name="Isosceles Triangle 5">
-            <a:extLst>
-              <a:ext uri="{FF2B5EF4-FFF2-40B4-BE49-F238E27FC236}">
-                <a16:creationId xmlns:a16="http://schemas.microsoft.com/office/drawing/2014/main" id="{9D774D4E-8070-461A-4CE4-5AF36724D05E}"/>
+          <p:cNvPr id="2" name="Title 1">
+            <a:extLst>
+              <a:ext uri="{FF2B5EF4-FFF2-40B4-BE49-F238E27FC236}">
+                <a16:creationId xmlns:a16="http://schemas.microsoft.com/office/drawing/2014/main" id="{059D2A06-5A87-324C-B6BA-3025A3E04A92}"/>
+              </a:ext>
+            </a:extLst>
+          </p:cNvPr>
+          <p:cNvSpPr>
+            <a:spLocks noGrp="1"/>
+          </p:cNvSpPr>
+          <p:nvPr>
+            <p:ph type="title"/>
+          </p:nvPr>
+        </p:nvSpPr>
+        <p:spPr/>
+        <p:txBody>
+          <a:bodyPr/>
+          <a:lstStyle/>
+          <a:p>
+            <a:r>
+              <a:rPr lang="en-US" dirty="0"/>
+              <a:t>Logistic Regression</a:t>
+            </a:r>
+          </a:p>
+        </p:txBody>
+      </p:sp>
+      <p:sp>
+        <p:nvSpPr>
+          <p:cNvPr id="3" name="TextBox 2">
+            <a:extLst>
+              <a:ext uri="{FF2B5EF4-FFF2-40B4-BE49-F238E27FC236}">
+                <a16:creationId xmlns:a16="http://schemas.microsoft.com/office/drawing/2014/main" id="{24B166E6-D4CE-0AE2-4B34-CFF0CDE1A04F}"/>
+              </a:ext>
+            </a:extLst>
+          </p:cNvPr>
+          <p:cNvSpPr txBox="1"/>
+          <p:nvPr/>
+        </p:nvSpPr>
+        <p:spPr>
+          <a:xfrm>
+            <a:off x="838200" y="1690688"/>
+            <a:ext cx="9525000" cy="923330"/>
+          </a:xfrm>
+          <a:prstGeom prst="rect">
+            <a:avLst/>
+          </a:prstGeom>
+          <a:noFill/>
+        </p:spPr>
+        <p:txBody>
+          <a:bodyPr wrap="square">
+            <a:spAutoFit/>
+          </a:bodyPr>
+          <a:lstStyle/>
+          <a:p>
+            <a:pPr>
+              <a:spcAft>
+                <a:spcPts val="600"/>
+              </a:spcAft>
+            </a:pPr>
+            <a:r>
+              <a:rPr lang="en-US" dirty="0">
+                <a:solidFill>
+                  <a:srgbClr val="333333"/>
+                </a:solidFill>
+              </a:rPr>
+              <a:t>Rather than a linear model, we will evaluate and prepare the data for use in a logistic regression, which predicts the log odds of satisfaction. Such models utilize different assumptions relative to linear models, significantly altering the necessary EDA steps.</a:t>
+            </a:r>
+          </a:p>
+        </p:txBody>
+      </p:sp>
+      <p:sp>
+        <p:nvSpPr>
+          <p:cNvPr id="5" name="TextBox 4">
+            <a:extLst>
+              <a:ext uri="{FF2B5EF4-FFF2-40B4-BE49-F238E27FC236}">
+                <a16:creationId xmlns:a16="http://schemas.microsoft.com/office/drawing/2014/main" id="{C577FEF2-B7C5-29ED-A509-B06085C94146}"/>
+              </a:ext>
+            </a:extLst>
+          </p:cNvPr>
+          <p:cNvSpPr txBox="1"/>
+          <p:nvPr/>
+        </p:nvSpPr>
+        <p:spPr>
+          <a:xfrm>
+            <a:off x="3486150" y="3275077"/>
+            <a:ext cx="7867650" cy="2970044"/>
+          </a:xfrm>
+          <a:prstGeom prst="rect">
+            <a:avLst/>
+          </a:prstGeom>
+          <a:noFill/>
+        </p:spPr>
+        <p:txBody>
+          <a:bodyPr wrap="square">
+            <a:spAutoFit/>
+          </a:bodyPr>
+          <a:lstStyle/>
+          <a:p>
+            <a:pPr>
+              <a:spcAft>
+                <a:spcPts val="600"/>
+              </a:spcAft>
+            </a:pPr>
+            <a:r>
+              <a:rPr lang="en-US" dirty="0">
+                <a:solidFill>
+                  <a:srgbClr val="333333"/>
+                </a:solidFill>
+              </a:rPr>
+              <a:t>Assumptions are altered as follows:</a:t>
+            </a:r>
+          </a:p>
+          <a:p>
+            <a:pPr marL="285750" indent="-285750">
+              <a:spcAft>
+                <a:spcPts val="600"/>
+              </a:spcAft>
+              <a:buFont typeface="Arial" panose="020B0604020202020204" pitchFamily="34" charset="0"/>
+              <a:buChar char="•"/>
+            </a:pPr>
+            <a:r>
+              <a:rPr lang="en-US" b="1" dirty="0">
+                <a:solidFill>
+                  <a:srgbClr val="333333"/>
+                </a:solidFill>
+              </a:rPr>
+              <a:t>Linearity</a:t>
+            </a:r>
+            <a:r>
+              <a:rPr lang="en-US" dirty="0">
+                <a:solidFill>
+                  <a:srgbClr val="333333"/>
+                </a:solidFill>
+              </a:rPr>
+              <a:t>: Rather than a linear relationship between parameters and the dependent variable, logistic regression assumes a linear relationship between parameters and the log odds</a:t>
+            </a:r>
+          </a:p>
+          <a:p>
+            <a:pPr marL="285750" indent="-285750">
+              <a:spcAft>
+                <a:spcPts val="600"/>
+              </a:spcAft>
+              <a:buFont typeface="Arial" panose="020B0604020202020204" pitchFamily="34" charset="0"/>
+              <a:buChar char="•"/>
+            </a:pPr>
+            <a:r>
+              <a:rPr lang="en-US" b="1" dirty="0">
+                <a:solidFill>
+                  <a:srgbClr val="333333"/>
+                </a:solidFill>
+              </a:rPr>
+              <a:t>Independence of Errors</a:t>
+            </a:r>
+            <a:r>
+              <a:rPr lang="en-US" dirty="0">
+                <a:solidFill>
+                  <a:srgbClr val="333333"/>
+                </a:solidFill>
+              </a:rPr>
+              <a:t>: Remains as an assumption for both linear and logistic models</a:t>
+            </a:r>
+          </a:p>
+          <a:p>
+            <a:pPr marL="285750" indent="-285750">
+              <a:spcAft>
+                <a:spcPts val="600"/>
+              </a:spcAft>
+              <a:buFont typeface="Arial" panose="020B0604020202020204" pitchFamily="34" charset="0"/>
+              <a:buChar char="•"/>
+            </a:pPr>
+            <a:r>
+              <a:rPr lang="en-US" b="1" dirty="0">
+                <a:solidFill>
+                  <a:srgbClr val="333333"/>
+                </a:solidFill>
+              </a:rPr>
+              <a:t>Homoscedasticity</a:t>
+            </a:r>
+            <a:r>
+              <a:rPr lang="en-US" dirty="0">
+                <a:solidFill>
+                  <a:srgbClr val="333333"/>
+                </a:solidFill>
+              </a:rPr>
+              <a:t>: Not required under logistic regression</a:t>
+            </a:r>
+          </a:p>
+          <a:p>
+            <a:pPr marL="285750" indent="-285750">
+              <a:spcAft>
+                <a:spcPts val="600"/>
+              </a:spcAft>
+              <a:buFont typeface="Arial" panose="020B0604020202020204" pitchFamily="34" charset="0"/>
+              <a:buChar char="•"/>
+            </a:pPr>
+            <a:r>
+              <a:rPr lang="en-US" b="1" dirty="0">
+                <a:solidFill>
+                  <a:srgbClr val="333333"/>
+                </a:solidFill>
+              </a:rPr>
+              <a:t>Normally distributed residuals</a:t>
+            </a:r>
+            <a:r>
+              <a:rPr lang="en-US" dirty="0">
+                <a:solidFill>
+                  <a:srgbClr val="333333"/>
+                </a:solidFill>
+              </a:rPr>
+              <a:t>: Not required under logistic regression</a:t>
+            </a:r>
+          </a:p>
+          <a:p>
+            <a:pPr marL="285750" indent="-285750">
+              <a:spcAft>
+                <a:spcPts val="600"/>
+              </a:spcAft>
+              <a:buFont typeface="Arial" panose="020B0604020202020204" pitchFamily="34" charset="0"/>
+              <a:buChar char="•"/>
+            </a:pPr>
+            <a:r>
+              <a:rPr lang="en-US" b="1" dirty="0">
+                <a:solidFill>
+                  <a:srgbClr val="333333"/>
+                </a:solidFill>
+              </a:rPr>
+              <a:t>Multicollinearity</a:t>
+            </a:r>
+            <a:r>
+              <a:rPr lang="en-US" dirty="0">
+                <a:solidFill>
+                  <a:srgbClr val="333333"/>
+                </a:solidFill>
+              </a:rPr>
+              <a:t>: Remains as an assumption for both linear and logistic models</a:t>
+            </a:r>
+            <a:endParaRPr lang="en-US" dirty="0"/>
+          </a:p>
+        </p:txBody>
+      </p:sp>
+      <p:sp>
+        <p:nvSpPr>
+          <p:cNvPr id="7" name="Isosceles Triangle 6">
+            <a:extLst>
+              <a:ext uri="{FF2B5EF4-FFF2-40B4-BE49-F238E27FC236}">
+                <a16:creationId xmlns:a16="http://schemas.microsoft.com/office/drawing/2014/main" id="{28A61623-7A8C-F95D-B241-A79B529615A4}"/>
               </a:ext>
             </a:extLst>
           </p:cNvPr>
@@ -9471,8 +9407,8 @@
           <p:nvPr/>
         </p:nvSpPr>
         <p:spPr>
-          <a:xfrm rot="10800000" flipH="1" flipV="1">
-            <a:off x="0" y="5724525"/>
+          <a:xfrm flipH="1" flipV="1">
+            <a:off x="7762873" y="-1"/>
             <a:ext cx="4429125" cy="1133475"/>
           </a:xfrm>
           <a:prstGeom prst="triangle">
@@ -9522,6 +9458,668 @@
       </p:sp>
       <p:pic>
         <p:nvPicPr>
+          <p:cNvPr id="9" name="Graphic 8" descr="Cloud">
+            <a:extLst>
+              <a:ext uri="{FF2B5EF4-FFF2-40B4-BE49-F238E27FC236}">
+                <a16:creationId xmlns:a16="http://schemas.microsoft.com/office/drawing/2014/main" id="{D425CA3D-625F-940E-10A1-D3D8A287A3B9}"/>
+              </a:ext>
+            </a:extLst>
+          </p:cNvPr>
+          <p:cNvPicPr>
+            <a:picLocks noChangeAspect="1"/>
+          </p:cNvPicPr>
+          <p:nvPr/>
+        </p:nvPicPr>
+        <p:blipFill>
+          <a:blip r:embed="rId2">
+            <a:extLst>
+              <a:ext uri="{28A0092B-C50C-407E-A947-70E740481C1C}">
+                <a14:useLocalDpi xmlns:a14="http://schemas.microsoft.com/office/drawing/2010/main" val="0"/>
+              </a:ext>
+              <a:ext uri="{96DAC541-7B7A-43D3-8B79-37D633B846F1}">
+                <asvg:svgBlip xmlns:asvg="http://schemas.microsoft.com/office/drawing/2016/SVG/main" r:embed="rId3"/>
+              </a:ext>
+            </a:extLst>
+          </a:blip>
+          <a:stretch>
+            <a:fillRect/>
+          </a:stretch>
+        </p:blipFill>
+        <p:spPr>
+          <a:xfrm>
+            <a:off x="10858500" y="-225426"/>
+            <a:ext cx="1333500" cy="1333500"/>
+          </a:xfrm>
+          <a:prstGeom prst="rect">
+            <a:avLst/>
+          </a:prstGeom>
+        </p:spPr>
+      </p:pic>
+      <p:pic>
+        <p:nvPicPr>
+          <p:cNvPr id="11" name="Graphic 10" descr="Briefcase">
+            <a:extLst>
+              <a:ext uri="{FF2B5EF4-FFF2-40B4-BE49-F238E27FC236}">
+                <a16:creationId xmlns:a16="http://schemas.microsoft.com/office/drawing/2014/main" id="{8534F7C1-4FBE-1F84-B88E-5FFF6F4C7DD3}"/>
+              </a:ext>
+            </a:extLst>
+          </p:cNvPr>
+          <p:cNvPicPr>
+            <a:picLocks noChangeAspect="1"/>
+          </p:cNvPicPr>
+          <p:nvPr/>
+        </p:nvPicPr>
+        <p:blipFill>
+          <a:blip r:embed="rId4">
+            <a:extLst>
+              <a:ext uri="{28A0092B-C50C-407E-A947-70E740481C1C}">
+                <a14:useLocalDpi xmlns:a14="http://schemas.microsoft.com/office/drawing/2010/main" val="0"/>
+              </a:ext>
+              <a:ext uri="{96DAC541-7B7A-43D3-8B79-37D633B846F1}">
+                <asvg:svgBlip xmlns:asvg="http://schemas.microsoft.com/office/drawing/2016/SVG/main" r:embed="rId5"/>
+              </a:ext>
+            </a:extLst>
+          </a:blip>
+          <a:stretch>
+            <a:fillRect/>
+          </a:stretch>
+        </p:blipFill>
+        <p:spPr>
+          <a:xfrm>
+            <a:off x="1829560" y="4914913"/>
+            <a:ext cx="1262278" cy="1262278"/>
+          </a:xfrm>
+          <a:prstGeom prst="rect">
+            <a:avLst/>
+          </a:prstGeom>
+        </p:spPr>
+      </p:pic>
+      <p:pic>
+        <p:nvPicPr>
+          <p:cNvPr id="15" name="Graphic 14" descr="Pilot">
+            <a:extLst>
+              <a:ext uri="{FF2B5EF4-FFF2-40B4-BE49-F238E27FC236}">
+                <a16:creationId xmlns:a16="http://schemas.microsoft.com/office/drawing/2014/main" id="{74FAA2D2-6AC5-04D8-6B14-695EBE6E4829}"/>
+              </a:ext>
+            </a:extLst>
+          </p:cNvPr>
+          <p:cNvPicPr>
+            <a:picLocks noChangeAspect="1"/>
+          </p:cNvPicPr>
+          <p:nvPr/>
+        </p:nvPicPr>
+        <p:blipFill>
+          <a:blip r:embed="rId6">
+            <a:extLst>
+              <a:ext uri="{28A0092B-C50C-407E-A947-70E740481C1C}">
+                <a14:useLocalDpi xmlns:a14="http://schemas.microsoft.com/office/drawing/2010/main" val="0"/>
+              </a:ext>
+              <a:ext uri="{96DAC541-7B7A-43D3-8B79-37D633B846F1}">
+                <asvg:svgBlip xmlns:asvg="http://schemas.microsoft.com/office/drawing/2016/SVG/main" r:embed="rId7"/>
+              </a:ext>
+            </a:extLst>
+          </a:blip>
+          <a:stretch>
+            <a:fillRect/>
+          </a:stretch>
+        </p:blipFill>
+        <p:spPr>
+          <a:xfrm>
+            <a:off x="877059" y="3018832"/>
+            <a:ext cx="1320801" cy="1320801"/>
+          </a:xfrm>
+          <a:prstGeom prst="rect">
+            <a:avLst/>
+          </a:prstGeom>
+        </p:spPr>
+      </p:pic>
+    </p:spTree>
+    <p:extLst>
+      <p:ext uri="{BB962C8B-B14F-4D97-AF65-F5344CB8AC3E}">
+        <p14:creationId xmlns:p14="http://schemas.microsoft.com/office/powerpoint/2010/main" val="344818731"/>
+      </p:ext>
+    </p:extLst>
+  </p:cSld>
+  <p:clrMapOvr>
+    <a:masterClrMapping/>
+  </p:clrMapOvr>
+</p:sld>
+</file>
+
+<file path=ppt/slides/slide21.xml><?xml version="1.0" encoding="utf-8"?>
+<p:sld xmlns:a="http://schemas.openxmlformats.org/drawingml/2006/main" xmlns:r="http://schemas.openxmlformats.org/officeDocument/2006/relationships" xmlns:p="http://schemas.openxmlformats.org/presentationml/2006/main">
+  <p:cSld>
+    <p:spTree>
+      <p:nvGrpSpPr>
+        <p:cNvPr id="1" name=""/>
+        <p:cNvGrpSpPr/>
+        <p:nvPr/>
+      </p:nvGrpSpPr>
+      <p:grpSpPr>
+        <a:xfrm>
+          <a:off x="0" y="0"/>
+          <a:ext cx="0" cy="0"/>
+          <a:chOff x="0" y="0"/>
+          <a:chExt cx="0" cy="0"/>
+        </a:xfrm>
+      </p:grpSpPr>
+      <p:sp>
+        <p:nvSpPr>
+          <p:cNvPr id="2" name="Title 1">
+            <a:extLst>
+              <a:ext uri="{FF2B5EF4-FFF2-40B4-BE49-F238E27FC236}">
+                <a16:creationId xmlns:a16="http://schemas.microsoft.com/office/drawing/2014/main" id="{9BB362AB-B86E-A3C6-C76F-4F5530C1D43B}"/>
+              </a:ext>
+            </a:extLst>
+          </p:cNvPr>
+          <p:cNvSpPr>
+            <a:spLocks noGrp="1"/>
+          </p:cNvSpPr>
+          <p:nvPr>
+            <p:ph type="title"/>
+          </p:nvPr>
+        </p:nvSpPr>
+        <p:spPr>
+          <a:xfrm>
+            <a:off x="838200" y="365125"/>
+            <a:ext cx="5486400" cy="1325563"/>
+          </a:xfrm>
+        </p:spPr>
+        <p:txBody>
+          <a:bodyPr/>
+          <a:lstStyle/>
+          <a:p>
+            <a:r>
+              <a:rPr lang="en-US" dirty="0"/>
+              <a:t>Testing Linearity </a:t>
+            </a:r>
+            <a:br>
+              <a:rPr lang="en-US" dirty="0"/>
+            </a:br>
+            <a:r>
+              <a:rPr lang="en-US" dirty="0"/>
+              <a:t>with Log Odds (1/3)</a:t>
+            </a:r>
+          </a:p>
+        </p:txBody>
+      </p:sp>
+      <p:sp>
+        <p:nvSpPr>
+          <p:cNvPr id="3" name="TextBox 2">
+            <a:extLst>
+              <a:ext uri="{FF2B5EF4-FFF2-40B4-BE49-F238E27FC236}">
+                <a16:creationId xmlns:a16="http://schemas.microsoft.com/office/drawing/2014/main" id="{5B469D07-E7E1-B5FF-7751-7D9F14F973C1}"/>
+              </a:ext>
+            </a:extLst>
+          </p:cNvPr>
+          <p:cNvSpPr txBox="1"/>
+          <p:nvPr/>
+        </p:nvSpPr>
+        <p:spPr>
+          <a:xfrm>
+            <a:off x="1701800" y="1904495"/>
+            <a:ext cx="7345870" cy="1200329"/>
+          </a:xfrm>
+          <a:prstGeom prst="rect">
+            <a:avLst/>
+          </a:prstGeom>
+          <a:noFill/>
+        </p:spPr>
+        <p:txBody>
+          <a:bodyPr wrap="square">
+            <a:spAutoFit/>
+          </a:bodyPr>
+          <a:lstStyle/>
+          <a:p>
+            <a:pPr>
+              <a:spcAft>
+                <a:spcPts val="600"/>
+              </a:spcAft>
+            </a:pPr>
+            <a:r>
+              <a:rPr lang="en-US" dirty="0">
+                <a:solidFill>
+                  <a:srgbClr val="333333"/>
+                </a:solidFill>
+              </a:rPr>
+              <a:t>Unlike a standard linear regression, which assumes that independent parameters have a linear relationship with the dependent variable, </a:t>
+            </a:r>
+            <a:r>
+              <a:rPr lang="en-US" b="1" dirty="0">
+                <a:solidFill>
+                  <a:srgbClr val="333333"/>
+                </a:solidFill>
+              </a:rPr>
+              <a:t>logistic regression assumes that parameters have a linear relationship with the log odds.</a:t>
+            </a:r>
+          </a:p>
+        </p:txBody>
+      </p:sp>
+      <p:sp>
+        <p:nvSpPr>
+          <p:cNvPr id="5" name="TextBox 4">
+            <a:extLst>
+              <a:ext uri="{FF2B5EF4-FFF2-40B4-BE49-F238E27FC236}">
+                <a16:creationId xmlns:a16="http://schemas.microsoft.com/office/drawing/2014/main" id="{24A99E9D-02CF-C8B9-06FB-12253987B204}"/>
+              </a:ext>
+            </a:extLst>
+          </p:cNvPr>
+          <p:cNvSpPr txBox="1"/>
+          <p:nvPr/>
+        </p:nvSpPr>
+        <p:spPr>
+          <a:xfrm>
+            <a:off x="2618500" y="3353272"/>
+            <a:ext cx="7392070" cy="1200329"/>
+          </a:xfrm>
+          <a:prstGeom prst="rect">
+            <a:avLst/>
+          </a:prstGeom>
+          <a:noFill/>
+        </p:spPr>
+        <p:txBody>
+          <a:bodyPr wrap="square">
+            <a:spAutoFit/>
+          </a:bodyPr>
+          <a:lstStyle/>
+          <a:p>
+            <a:pPr>
+              <a:spcAft>
+                <a:spcPts val="600"/>
+              </a:spcAft>
+            </a:pPr>
+            <a:r>
+              <a:rPr lang="en-US" dirty="0">
+                <a:solidFill>
+                  <a:srgbClr val="333333"/>
+                </a:solidFill>
+              </a:rPr>
+              <a:t>Odds represent the number of favorable outcomes divided by the number of unfavorable outcomes. Put differently, if “p” represents the probability of favorable outcomes, </a:t>
+            </a:r>
+            <a:r>
+              <a:rPr lang="en-US" b="1" dirty="0">
+                <a:solidFill>
+                  <a:srgbClr val="333333"/>
+                </a:solidFill>
+              </a:rPr>
+              <a:t>Odds = p/(1-p). Log odds take the natural log of the odds, which can be expressed as ln(p/1-p)).</a:t>
+            </a:r>
+          </a:p>
+        </p:txBody>
+      </p:sp>
+      <p:sp>
+        <p:nvSpPr>
+          <p:cNvPr id="7" name="TextBox 6">
+            <a:extLst>
+              <a:ext uri="{FF2B5EF4-FFF2-40B4-BE49-F238E27FC236}">
+                <a16:creationId xmlns:a16="http://schemas.microsoft.com/office/drawing/2014/main" id="{07868C0A-A8AD-AC37-B0C8-338A4ED6BC96}"/>
+              </a:ext>
+            </a:extLst>
+          </p:cNvPr>
+          <p:cNvSpPr txBox="1"/>
+          <p:nvPr/>
+        </p:nvSpPr>
+        <p:spPr>
+          <a:xfrm>
+            <a:off x="3581400" y="4802049"/>
+            <a:ext cx="7877175" cy="1477328"/>
+          </a:xfrm>
+          <a:prstGeom prst="rect">
+            <a:avLst/>
+          </a:prstGeom>
+          <a:noFill/>
+        </p:spPr>
+        <p:txBody>
+          <a:bodyPr wrap="square">
+            <a:spAutoFit/>
+          </a:bodyPr>
+          <a:lstStyle/>
+          <a:p>
+            <a:pPr>
+              <a:spcAft>
+                <a:spcPts val="600"/>
+              </a:spcAft>
+            </a:pPr>
+            <a:r>
+              <a:rPr lang="en-US" dirty="0">
+                <a:solidFill>
+                  <a:srgbClr val="333333"/>
+                </a:solidFill>
+              </a:rPr>
+              <a:t>We can use a visual test to examine whether or not this assumption holds true for continuous variables. While it is not sensible to compute log odds for individual data points, </a:t>
+            </a:r>
+            <a:r>
+              <a:rPr lang="en-US" b="1" dirty="0">
+                <a:solidFill>
+                  <a:srgbClr val="333333"/>
+                </a:solidFill>
+              </a:rPr>
+              <a:t>we can group continuous variables into discrete buckets—calculating the average log odds for each</a:t>
+            </a:r>
+            <a:r>
+              <a:rPr lang="en-US" dirty="0">
+                <a:solidFill>
+                  <a:srgbClr val="333333"/>
+                </a:solidFill>
+              </a:rPr>
+              <a:t>—to examine whether or not they might satisfy this assumption.</a:t>
+            </a:r>
+            <a:endParaRPr lang="en-US" dirty="0"/>
+          </a:p>
+        </p:txBody>
+      </p:sp>
+      <p:pic>
+        <p:nvPicPr>
+          <p:cNvPr id="12" name="Graphic 11" descr="Mountain scene">
+            <a:extLst>
+              <a:ext uri="{FF2B5EF4-FFF2-40B4-BE49-F238E27FC236}">
+                <a16:creationId xmlns:a16="http://schemas.microsoft.com/office/drawing/2014/main" id="{7035C8CA-E5E4-1F8B-958D-529DB980C2C6}"/>
+              </a:ext>
+            </a:extLst>
+          </p:cNvPr>
+          <p:cNvPicPr>
+            <a:picLocks noChangeAspect="1"/>
+          </p:cNvPicPr>
+          <p:nvPr/>
+        </p:nvPicPr>
+        <p:blipFill>
+          <a:blip r:embed="rId2">
+            <a:extLst>
+              <a:ext uri="{28A0092B-C50C-407E-A947-70E740481C1C}">
+                <a14:useLocalDpi xmlns:a14="http://schemas.microsoft.com/office/drawing/2010/main" val="0"/>
+              </a:ext>
+              <a:ext uri="{96DAC541-7B7A-43D3-8B79-37D633B846F1}">
+                <asvg:svgBlip xmlns:asvg="http://schemas.microsoft.com/office/drawing/2016/SVG/main" r:embed="rId3"/>
+              </a:ext>
+            </a:extLst>
+          </a:blip>
+          <a:stretch>
+            <a:fillRect/>
+          </a:stretch>
+        </p:blipFill>
+        <p:spPr>
+          <a:xfrm>
+            <a:off x="1704100" y="3496236"/>
+            <a:ext cx="914400" cy="914400"/>
+          </a:xfrm>
+          <a:prstGeom prst="rect">
+            <a:avLst/>
+          </a:prstGeom>
+        </p:spPr>
+      </p:pic>
+      <p:pic>
+        <p:nvPicPr>
+          <p:cNvPr id="14" name="Graphic 13" descr="Tropical scene">
+            <a:extLst>
+              <a:ext uri="{FF2B5EF4-FFF2-40B4-BE49-F238E27FC236}">
+                <a16:creationId xmlns:a16="http://schemas.microsoft.com/office/drawing/2014/main" id="{0CEC0B41-A241-066D-8FE5-DFC86C1A59AD}"/>
+              </a:ext>
+            </a:extLst>
+          </p:cNvPr>
+          <p:cNvPicPr>
+            <a:picLocks noChangeAspect="1"/>
+          </p:cNvPicPr>
+          <p:nvPr/>
+        </p:nvPicPr>
+        <p:blipFill>
+          <a:blip r:embed="rId4">
+            <a:extLst>
+              <a:ext uri="{28A0092B-C50C-407E-A947-70E740481C1C}">
+                <a14:useLocalDpi xmlns:a14="http://schemas.microsoft.com/office/drawing/2010/main" val="0"/>
+              </a:ext>
+              <a:ext uri="{96DAC541-7B7A-43D3-8B79-37D633B846F1}">
+                <asvg:svgBlip xmlns:asvg="http://schemas.microsoft.com/office/drawing/2016/SVG/main" r:embed="rId5"/>
+              </a:ext>
+            </a:extLst>
+          </a:blip>
+          <a:stretch>
+            <a:fillRect/>
+          </a:stretch>
+        </p:blipFill>
+        <p:spPr>
+          <a:xfrm>
+            <a:off x="787400" y="2053154"/>
+            <a:ext cx="914400" cy="914400"/>
+          </a:xfrm>
+          <a:prstGeom prst="rect">
+            <a:avLst/>
+          </a:prstGeom>
+        </p:spPr>
+      </p:pic>
+      <p:pic>
+        <p:nvPicPr>
+          <p:cNvPr id="16" name="Graphic 15" descr="City">
+            <a:extLst>
+              <a:ext uri="{FF2B5EF4-FFF2-40B4-BE49-F238E27FC236}">
+                <a16:creationId xmlns:a16="http://schemas.microsoft.com/office/drawing/2014/main" id="{8D25AA89-71E7-FDE7-AEC5-942635CD3666}"/>
+              </a:ext>
+            </a:extLst>
+          </p:cNvPr>
+          <p:cNvPicPr>
+            <a:picLocks noChangeAspect="1"/>
+          </p:cNvPicPr>
+          <p:nvPr/>
+        </p:nvPicPr>
+        <p:blipFill>
+          <a:blip r:embed="rId6">
+            <a:extLst>
+              <a:ext uri="{28A0092B-C50C-407E-A947-70E740481C1C}">
+                <a14:useLocalDpi xmlns:a14="http://schemas.microsoft.com/office/drawing/2010/main" val="0"/>
+              </a:ext>
+              <a:ext uri="{96DAC541-7B7A-43D3-8B79-37D633B846F1}">
+                <asvg:svgBlip xmlns:asvg="http://schemas.microsoft.com/office/drawing/2016/SVG/main" r:embed="rId7"/>
+              </a:ext>
+            </a:extLst>
+          </a:blip>
+          <a:stretch>
+            <a:fillRect/>
+          </a:stretch>
+        </p:blipFill>
+        <p:spPr>
+          <a:xfrm>
+            <a:off x="2667000" y="5083513"/>
+            <a:ext cx="914400" cy="914400"/>
+          </a:xfrm>
+          <a:prstGeom prst="rect">
+            <a:avLst/>
+          </a:prstGeom>
+        </p:spPr>
+      </p:pic>
+      <p:sp>
+        <p:nvSpPr>
+          <p:cNvPr id="17" name="Isosceles Triangle 16">
+            <a:extLst>
+              <a:ext uri="{FF2B5EF4-FFF2-40B4-BE49-F238E27FC236}">
+                <a16:creationId xmlns:a16="http://schemas.microsoft.com/office/drawing/2014/main" id="{B7E51072-487B-7841-86FC-29E0CB8278A4}"/>
+              </a:ext>
+            </a:extLst>
+          </p:cNvPr>
+          <p:cNvSpPr/>
+          <p:nvPr/>
+        </p:nvSpPr>
+        <p:spPr>
+          <a:xfrm flipH="1" flipV="1">
+            <a:off x="7762873" y="-1"/>
+            <a:ext cx="4429125" cy="1133475"/>
+          </a:xfrm>
+          <a:prstGeom prst="triangle">
+            <a:avLst>
+              <a:gd name="adj" fmla="val 0"/>
+            </a:avLst>
+          </a:prstGeom>
+          <a:solidFill>
+            <a:schemeClr val="accent1">
+              <a:lumMod val="40000"/>
+              <a:lumOff val="60000"/>
+            </a:schemeClr>
+          </a:solidFill>
+          <a:ln>
+            <a:solidFill>
+              <a:schemeClr val="tx2">
+                <a:lumMod val="40000"/>
+                <a:lumOff val="60000"/>
+              </a:schemeClr>
+            </a:solidFill>
+          </a:ln>
+        </p:spPr>
+        <p:style>
+          <a:lnRef idx="2">
+            <a:schemeClr val="accent1">
+              <a:shade val="15000"/>
+            </a:schemeClr>
+          </a:lnRef>
+          <a:fillRef idx="1">
+            <a:schemeClr val="accent1"/>
+          </a:fillRef>
+          <a:effectRef idx="0">
+            <a:schemeClr val="accent1"/>
+          </a:effectRef>
+          <a:fontRef idx="minor">
+            <a:schemeClr val="lt1"/>
+          </a:fontRef>
+        </p:style>
+        <p:txBody>
+          <a:bodyPr rtlCol="0" anchor="ctr"/>
+          <a:lstStyle/>
+          <a:p>
+            <a:pPr algn="ctr"/>
+            <a:endParaRPr lang="en-US"/>
+          </a:p>
+        </p:txBody>
+      </p:sp>
+      <p:pic>
+        <p:nvPicPr>
+          <p:cNvPr id="18" name="Graphic 17" descr="Cloud">
+            <a:extLst>
+              <a:ext uri="{FF2B5EF4-FFF2-40B4-BE49-F238E27FC236}">
+                <a16:creationId xmlns:a16="http://schemas.microsoft.com/office/drawing/2014/main" id="{D4ABD1C4-AE72-9CE0-0DA8-0E7B47F4FACB}"/>
+              </a:ext>
+            </a:extLst>
+          </p:cNvPr>
+          <p:cNvPicPr>
+            <a:picLocks noChangeAspect="1"/>
+          </p:cNvPicPr>
+          <p:nvPr/>
+        </p:nvPicPr>
+        <p:blipFill>
+          <a:blip r:embed="rId8">
+            <a:extLst>
+              <a:ext uri="{28A0092B-C50C-407E-A947-70E740481C1C}">
+                <a14:useLocalDpi xmlns:a14="http://schemas.microsoft.com/office/drawing/2010/main" val="0"/>
+              </a:ext>
+              <a:ext uri="{96DAC541-7B7A-43D3-8B79-37D633B846F1}">
+                <asvg:svgBlip xmlns:asvg="http://schemas.microsoft.com/office/drawing/2016/SVG/main" r:embed="rId9"/>
+              </a:ext>
+            </a:extLst>
+          </a:blip>
+          <a:stretch>
+            <a:fillRect/>
+          </a:stretch>
+        </p:blipFill>
+        <p:spPr>
+          <a:xfrm>
+            <a:off x="10858500" y="-225426"/>
+            <a:ext cx="1333500" cy="1333500"/>
+          </a:xfrm>
+          <a:prstGeom prst="rect">
+            <a:avLst/>
+          </a:prstGeom>
+        </p:spPr>
+      </p:pic>
+    </p:spTree>
+    <p:extLst>
+      <p:ext uri="{BB962C8B-B14F-4D97-AF65-F5344CB8AC3E}">
+        <p14:creationId xmlns:p14="http://schemas.microsoft.com/office/powerpoint/2010/main" val="1573223430"/>
+      </p:ext>
+    </p:extLst>
+  </p:cSld>
+  <p:clrMapOvr>
+    <a:masterClrMapping/>
+  </p:clrMapOvr>
+</p:sld>
+</file>
+
+<file path=ppt/slides/slide22.xml><?xml version="1.0" encoding="utf-8"?>
+<p:sld xmlns:a="http://schemas.openxmlformats.org/drawingml/2006/main" xmlns:r="http://schemas.openxmlformats.org/officeDocument/2006/relationships" xmlns:p="http://schemas.openxmlformats.org/presentationml/2006/main">
+  <p:cSld>
+    <p:spTree>
+      <p:nvGrpSpPr>
+        <p:cNvPr id="1" name=""/>
+        <p:cNvGrpSpPr/>
+        <p:nvPr/>
+      </p:nvGrpSpPr>
+      <p:grpSpPr>
+        <a:xfrm>
+          <a:off x="0" y="0"/>
+          <a:ext cx="0" cy="0"/>
+          <a:chOff x="0" y="0"/>
+          <a:chExt cx="0" cy="0"/>
+        </a:xfrm>
+      </p:grpSpPr>
+      <p:sp>
+        <p:nvSpPr>
+          <p:cNvPr id="6" name="Isosceles Triangle 5">
+            <a:extLst>
+              <a:ext uri="{FF2B5EF4-FFF2-40B4-BE49-F238E27FC236}">
+                <a16:creationId xmlns:a16="http://schemas.microsoft.com/office/drawing/2014/main" id="{9D774D4E-8070-461A-4CE4-5AF36724D05E}"/>
+              </a:ext>
+            </a:extLst>
+          </p:cNvPr>
+          <p:cNvSpPr/>
+          <p:nvPr/>
+        </p:nvSpPr>
+        <p:spPr>
+          <a:xfrm rot="10800000" flipH="1" flipV="1">
+            <a:off x="0" y="5724525"/>
+            <a:ext cx="4429125" cy="1133475"/>
+          </a:xfrm>
+          <a:prstGeom prst="triangle">
+            <a:avLst>
+              <a:gd name="adj" fmla="val 0"/>
+            </a:avLst>
+          </a:prstGeom>
+          <a:solidFill>
+            <a:schemeClr val="accent1">
+              <a:lumMod val="40000"/>
+              <a:lumOff val="60000"/>
+            </a:schemeClr>
+          </a:solidFill>
+          <a:ln>
+            <a:solidFill>
+              <a:schemeClr val="tx2">
+                <a:lumMod val="40000"/>
+                <a:lumOff val="60000"/>
+              </a:schemeClr>
+            </a:solidFill>
+          </a:ln>
+        </p:spPr>
+        <p:style>
+          <a:lnRef idx="2">
+            <a:schemeClr val="accent1">
+              <a:shade val="15000"/>
+            </a:schemeClr>
+          </a:lnRef>
+          <a:fillRef idx="1">
+            <a:schemeClr val="accent1"/>
+          </a:fillRef>
+          <a:effectRef idx="0">
+            <a:schemeClr val="accent1"/>
+          </a:effectRef>
+          <a:fontRef idx="minor">
+            <a:schemeClr val="lt1"/>
+          </a:fontRef>
+        </p:style>
+        <p:txBody>
+          <a:bodyPr rtlCol="0" anchor="ctr"/>
+          <a:lstStyle/>
+          <a:p>
+            <a:pPr algn="ctr"/>
+            <a:endParaRPr lang="en-US"/>
+          </a:p>
+        </p:txBody>
+      </p:sp>
+      <p:pic>
+        <p:nvPicPr>
           <p:cNvPr id="8" name="Graphic 7" descr="Cloud">
             <a:extLst>
               <a:ext uri="{FF2B5EF4-FFF2-40B4-BE49-F238E27FC236}">
@@ -9880,7 +10478,7 @@
 </p:sld>
 </file>
 
-<file path=ppt/slides/slide21.xml><?xml version="1.0" encoding="utf-8"?>
+<file path=ppt/slides/slide23.xml><?xml version="1.0" encoding="utf-8"?>
 <p:sld xmlns:a="http://schemas.openxmlformats.org/drawingml/2006/main" xmlns:r="http://schemas.openxmlformats.org/officeDocument/2006/relationships" xmlns:p="http://schemas.openxmlformats.org/presentationml/2006/main">
   <p:cSld>
     <p:spTree>

</xml_diff>